<commit_message>
Swapped pictures and added more text
</commit_message>
<xml_diff>
--- a/Git 101.pptx
+++ b/Git 101.pptx
@@ -115,6 +115,11 @@
       </a:defRPr>
     </a:lvl9pPr>
   </p:defaultTextStyle>
+  <p:extLst>
+    <p:ext uri="{EFAFB233-063F-42B5-8137-9DF3F51BA10A}">
+      <p15:sldGuideLst xmlns:p15="http://schemas.microsoft.com/office/powerpoint/2012/main"/>
+    </p:ext>
+  </p:extLst>
 </p:presentation>
 </file>
 
@@ -7970,46 +7975,6 @@
           </a:ln>
         </p:spPr>
       </p:sp>
-      <p:pic>
-        <p:nvPicPr>
-          <p:cNvPr id="4098" name="Picture 2" descr="https://i.ytimg.com/vi/r0ji8FDNTj0/maxresdefault.jpg"/>
-          <p:cNvPicPr>
-            <a:picLocks noChangeAspect="1" noChangeArrowheads="1"/>
-          </p:cNvPicPr>
-          <p:nvPr/>
-        </p:nvPicPr>
-        <p:blipFill rotWithShape="1">
-          <a:blip r:embed="rId2">
-            <a:extLst>
-              <a:ext uri="{28A0092B-C50C-407E-A947-70E740481C1C}">
-                <a14:useLocalDpi xmlns:a14="http://schemas.microsoft.com/office/drawing/2010/main" val="0"/>
-              </a:ext>
-            </a:extLst>
-          </a:blip>
-          <a:srcRect/>
-          <a:stretch/>
-        </p:blipFill>
-        <p:spPr bwMode="auto">
-          <a:xfrm>
-            <a:off x="6093992" y="1896217"/>
-            <a:ext cx="5449889" cy="3065562"/>
-          </a:xfrm>
-          <a:prstGeom prst="rect">
-            <a:avLst/>
-          </a:prstGeom>
-          <a:noFill/>
-          <a:effectLst/>
-          <a:extLst>
-            <a:ext uri="{909E8E84-426E-40DD-AFC4-6F175D3DCCD1}">
-              <a14:hiddenFill xmlns:a14="http://schemas.microsoft.com/office/drawing/2010/main">
-                <a:solidFill>
-                  <a:srgbClr val="FFFFFF"/>
-                </a:solidFill>
-              </a14:hiddenFill>
-            </a:ext>
-          </a:extLst>
-        </p:spPr>
-      </p:pic>
       <p:sp>
         <p:nvSpPr>
           <p:cNvPr id="71" name="Rectangle 70"/>
@@ -8119,27 +8084,27 @@
               </a:lnSpc>
             </a:pPr>
             <a:r>
-              <a:rPr lang="en-US" sz="1700" err="1">
+              <a:rPr lang="en-US" sz="1700" dirty="0" err="1">
                 <a:latin typeface="Courier New" panose="02070309020205020404" pitchFamily="49" charset="0"/>
                 <a:cs typeface="Courier New" panose="02070309020205020404" pitchFamily="49" charset="0"/>
               </a:rPr>
               <a:t>git</a:t>
             </a:r>
             <a:r>
-              <a:rPr lang="en-US" sz="1700">
+              <a:rPr lang="en-US" sz="1700" dirty="0">
                 <a:latin typeface="Courier New" panose="02070309020205020404" pitchFamily="49" charset="0"/>
                 <a:cs typeface="Courier New" panose="02070309020205020404" pitchFamily="49" charset="0"/>
               </a:rPr>
               <a:t> </a:t>
             </a:r>
             <a:r>
-              <a:rPr lang="en-US" sz="1700" err="1">
+              <a:rPr lang="en-US" sz="1700" dirty="0" err="1">
                 <a:latin typeface="Courier New" panose="02070309020205020404" pitchFamily="49" charset="0"/>
                 <a:cs typeface="Courier New" panose="02070309020205020404" pitchFamily="49" charset="0"/>
               </a:rPr>
               <a:t>init</a:t>
             </a:r>
-            <a:endParaRPr lang="en-US" sz="1700">
+            <a:endParaRPr lang="en-US" sz="1700" dirty="0">
               <a:latin typeface="Courier New" panose="02070309020205020404" pitchFamily="49" charset="0"/>
               <a:cs typeface="Courier New" panose="02070309020205020404" pitchFamily="49" charset="0"/>
             </a:endParaRPr>
@@ -8151,19 +8116,58 @@
               </a:lnSpc>
             </a:pPr>
             <a:r>
-              <a:rPr lang="en-US" sz="1700" err="1">
+              <a:rPr lang="en-US" sz="1700" dirty="0" err="1">
                 <a:latin typeface="Courier New" panose="02070309020205020404" pitchFamily="49" charset="0"/>
                 <a:cs typeface="Courier New" panose="02070309020205020404" pitchFamily="49" charset="0"/>
               </a:rPr>
               <a:t>git</a:t>
             </a:r>
             <a:r>
-              <a:rPr lang="en-US" sz="1700">
+              <a:rPr lang="en-US" sz="1700" dirty="0">
                 <a:latin typeface="Courier New" panose="02070309020205020404" pitchFamily="49" charset="0"/>
                 <a:cs typeface="Courier New" panose="02070309020205020404" pitchFamily="49" charset="0"/>
               </a:rPr>
-              <a:t> clone</a:t>
-            </a:r>
+              <a:t> clone {repo </a:t>
+            </a:r>
+            <a:r>
+              <a:rPr lang="en-US" sz="1700" dirty="0" err="1">
+                <a:latin typeface="Courier New" panose="02070309020205020404" pitchFamily="49" charset="0"/>
+                <a:cs typeface="Courier New" panose="02070309020205020404" pitchFamily="49" charset="0"/>
+              </a:rPr>
+              <a:t>url</a:t>
+            </a:r>
+            <a:r>
+              <a:rPr lang="en-US" sz="1700" dirty="0">
+                <a:latin typeface="Courier New" panose="02070309020205020404" pitchFamily="49" charset="0"/>
+                <a:cs typeface="Courier New" panose="02070309020205020404" pitchFamily="49" charset="0"/>
+              </a:rPr>
+              <a:t>}</a:t>
+            </a:r>
+          </a:p>
+          <a:p>
+            <a:pPr lvl="2">
+              <a:lnSpc>
+                <a:spcPct val="80000"/>
+              </a:lnSpc>
+            </a:pPr>
+            <a:r>
+              <a:rPr lang="en-US" sz="1500" dirty="0">
+                <a:latin typeface="Courier New" panose="02070309020205020404" pitchFamily="49" charset="0"/>
+                <a:cs typeface="Courier New" panose="02070309020205020404" pitchFamily="49" charset="0"/>
+              </a:rPr>
+              <a:t>Use http or </a:t>
+            </a:r>
+            <a:r>
+              <a:rPr lang="en-US" sz="1500" dirty="0" err="1">
+                <a:latin typeface="Courier New" panose="02070309020205020404" pitchFamily="49" charset="0"/>
+                <a:cs typeface="Courier New" panose="02070309020205020404" pitchFamily="49" charset="0"/>
+              </a:rPr>
+              <a:t>ssh</a:t>
+            </a:r>
+            <a:endParaRPr lang="en-US" sz="1500" dirty="0">
+              <a:latin typeface="Courier New" panose="02070309020205020404" pitchFamily="49" charset="0"/>
+              <a:cs typeface="Courier New" panose="02070309020205020404" pitchFamily="49" charset="0"/>
+            </a:endParaRPr>
           </a:p>
           <a:p>
             <a:pPr>
@@ -8172,27 +8176,27 @@
               </a:lnSpc>
             </a:pPr>
             <a:r>
-              <a:rPr lang="en-US" sz="1700" err="1">
+              <a:rPr lang="en-US" sz="1700" dirty="0" err="1">
                 <a:latin typeface="Courier New" panose="02070309020205020404" pitchFamily="49" charset="0"/>
                 <a:cs typeface="Courier New" panose="02070309020205020404" pitchFamily="49" charset="0"/>
               </a:rPr>
               <a:t>git</a:t>
             </a:r>
             <a:r>
-              <a:rPr lang="en-US" sz="1700">
+              <a:rPr lang="en-US" sz="1700" dirty="0">
                 <a:latin typeface="Courier New" panose="02070309020205020404" pitchFamily="49" charset="0"/>
                 <a:cs typeface="Courier New" panose="02070309020205020404" pitchFamily="49" charset="0"/>
               </a:rPr>
               <a:t> add </a:t>
             </a:r>
             <a:r>
-              <a:rPr lang="en-US" sz="1700" err="1">
+              <a:rPr lang="en-US" sz="1700" dirty="0" err="1">
                 <a:latin typeface="Courier New" panose="02070309020205020404" pitchFamily="49" charset="0"/>
                 <a:cs typeface="Courier New" panose="02070309020205020404" pitchFamily="49" charset="0"/>
               </a:rPr>
               <a:t>somefile.thing</a:t>
             </a:r>
-            <a:endParaRPr lang="en-US" sz="1700">
+            <a:endParaRPr lang="en-US" sz="1700" dirty="0">
               <a:latin typeface="Courier New" panose="02070309020205020404" pitchFamily="49" charset="0"/>
               <a:cs typeface="Courier New" panose="02070309020205020404" pitchFamily="49" charset="0"/>
             </a:endParaRPr>
@@ -8204,14 +8208,14 @@
               </a:lnSpc>
             </a:pPr>
             <a:r>
-              <a:rPr lang="en-US" sz="1700" err="1">
+              <a:rPr lang="en-US" sz="1700" dirty="0" err="1">
                 <a:latin typeface="Courier New" panose="02070309020205020404" pitchFamily="49" charset="0"/>
                 <a:cs typeface="Courier New" panose="02070309020205020404" pitchFamily="49" charset="0"/>
               </a:rPr>
               <a:t>git</a:t>
             </a:r>
             <a:r>
-              <a:rPr lang="en-US" sz="1700">
+              <a:rPr lang="en-US" sz="1700" dirty="0">
                 <a:latin typeface="Courier New" panose="02070309020205020404" pitchFamily="49" charset="0"/>
                 <a:cs typeface="Courier New" panose="02070309020205020404" pitchFamily="49" charset="0"/>
               </a:rPr>
@@ -8225,14 +8229,14 @@
               </a:lnSpc>
             </a:pPr>
             <a:r>
-              <a:rPr lang="en-US" sz="1700" err="1">
+              <a:rPr lang="en-US" sz="1700" dirty="0" err="1">
                 <a:latin typeface="Courier New" panose="02070309020205020404" pitchFamily="49" charset="0"/>
                 <a:cs typeface="Courier New" panose="02070309020205020404" pitchFamily="49" charset="0"/>
               </a:rPr>
               <a:t>git</a:t>
             </a:r>
             <a:r>
-              <a:rPr lang="en-US" sz="1700">
+              <a:rPr lang="en-US" sz="1700" dirty="0">
                 <a:latin typeface="Courier New" panose="02070309020205020404" pitchFamily="49" charset="0"/>
                 <a:cs typeface="Courier New" panose="02070309020205020404" pitchFamily="49" charset="0"/>
               </a:rPr>
@@ -8246,14 +8250,14 @@
               </a:lnSpc>
             </a:pPr>
             <a:r>
-              <a:rPr lang="en-US" sz="1700" err="1">
+              <a:rPr lang="en-US" sz="1700" dirty="0" err="1">
                 <a:latin typeface="Courier New" panose="02070309020205020404" pitchFamily="49" charset="0"/>
                 <a:cs typeface="Courier New" panose="02070309020205020404" pitchFamily="49" charset="0"/>
               </a:rPr>
               <a:t>git</a:t>
             </a:r>
             <a:r>
-              <a:rPr lang="en-US" sz="1700">
+              <a:rPr lang="en-US" sz="1700" dirty="0">
                 <a:latin typeface="Courier New" panose="02070309020205020404" pitchFamily="49" charset="0"/>
                 <a:cs typeface="Courier New" panose="02070309020205020404" pitchFamily="49" charset="0"/>
               </a:rPr>
@@ -8267,14 +8271,14 @@
               </a:lnSpc>
             </a:pPr>
             <a:r>
-              <a:rPr lang="en-US" sz="1700" err="1">
+              <a:rPr lang="en-US" sz="1700" dirty="0" err="1">
                 <a:latin typeface="Courier New" panose="02070309020205020404" pitchFamily="49" charset="0"/>
                 <a:cs typeface="Courier New" panose="02070309020205020404" pitchFamily="49" charset="0"/>
               </a:rPr>
               <a:t>git</a:t>
             </a:r>
             <a:r>
-              <a:rPr lang="en-US" sz="1700">
+              <a:rPr lang="en-US" sz="1700" dirty="0">
                 <a:latin typeface="Courier New" panose="02070309020205020404" pitchFamily="49" charset="0"/>
                 <a:cs typeface="Courier New" panose="02070309020205020404" pitchFamily="49" charset="0"/>
               </a:rPr>
@@ -8288,27 +8292,27 @@
               </a:lnSpc>
             </a:pPr>
             <a:r>
-              <a:rPr lang="en-US" sz="1700" err="1">
+              <a:rPr lang="en-US" sz="1700" dirty="0" err="1">
                 <a:latin typeface="Courier New" panose="02070309020205020404" pitchFamily="49" charset="0"/>
                 <a:cs typeface="Courier New" panose="02070309020205020404" pitchFamily="49" charset="0"/>
               </a:rPr>
               <a:t>git</a:t>
             </a:r>
             <a:r>
-              <a:rPr lang="en-US" sz="1700">
+              <a:rPr lang="en-US" sz="1700" dirty="0">
                 <a:latin typeface="Courier New" panose="02070309020205020404" pitchFamily="49" charset="0"/>
                 <a:cs typeface="Courier New" panose="02070309020205020404" pitchFamily="49" charset="0"/>
               </a:rPr>
               <a:t> branch </a:t>
             </a:r>
             <a:r>
-              <a:rPr lang="en-US" sz="1700" err="1">
+              <a:rPr lang="en-US" sz="1700" dirty="0" err="1">
                 <a:latin typeface="Courier New" panose="02070309020205020404" pitchFamily="49" charset="0"/>
                 <a:cs typeface="Courier New" panose="02070309020205020404" pitchFamily="49" charset="0"/>
               </a:rPr>
               <a:t>branchname</a:t>
             </a:r>
-            <a:endParaRPr lang="en-US" sz="1700">
+            <a:endParaRPr lang="en-US" sz="1700" dirty="0">
               <a:latin typeface="Courier New" panose="02070309020205020404" pitchFamily="49" charset="0"/>
               <a:cs typeface="Courier New" panose="02070309020205020404" pitchFamily="49" charset="0"/>
             </a:endParaRPr>
@@ -8320,27 +8324,27 @@
               </a:lnSpc>
             </a:pPr>
             <a:r>
-              <a:rPr lang="en-US" sz="1700" err="1">
+              <a:rPr lang="en-US" sz="1700" dirty="0" err="1">
                 <a:latin typeface="Courier New" panose="02070309020205020404" pitchFamily="49" charset="0"/>
                 <a:cs typeface="Courier New" panose="02070309020205020404" pitchFamily="49" charset="0"/>
               </a:rPr>
               <a:t>git</a:t>
             </a:r>
             <a:r>
-              <a:rPr lang="en-US" sz="1700">
+              <a:rPr lang="en-US" sz="1700" dirty="0">
                 <a:latin typeface="Courier New" panose="02070309020205020404" pitchFamily="49" charset="0"/>
                 <a:cs typeface="Courier New" panose="02070309020205020404" pitchFamily="49" charset="0"/>
               </a:rPr>
               <a:t> checkout </a:t>
             </a:r>
             <a:r>
-              <a:rPr lang="en-US" sz="1700" err="1">
+              <a:rPr lang="en-US" sz="1700" dirty="0" err="1">
                 <a:latin typeface="Courier New" panose="02070309020205020404" pitchFamily="49" charset="0"/>
                 <a:cs typeface="Courier New" panose="02070309020205020404" pitchFamily="49" charset="0"/>
               </a:rPr>
               <a:t>branchname</a:t>
             </a:r>
-            <a:endParaRPr lang="en-US" sz="1700">
+            <a:endParaRPr lang="en-US" sz="1700" dirty="0">
               <a:latin typeface="Courier New" panose="02070309020205020404" pitchFamily="49" charset="0"/>
               <a:cs typeface="Courier New" panose="02070309020205020404" pitchFamily="49" charset="0"/>
             </a:endParaRPr>
@@ -8352,14 +8356,14 @@
               </a:lnSpc>
             </a:pPr>
             <a:r>
-              <a:rPr lang="en-US" sz="1700" err="1">
+              <a:rPr lang="en-US" sz="1700" dirty="0" err="1">
                 <a:latin typeface="Courier New" panose="02070309020205020404" pitchFamily="49" charset="0"/>
                 <a:cs typeface="Courier New" panose="02070309020205020404" pitchFamily="49" charset="0"/>
               </a:rPr>
               <a:t>git</a:t>
             </a:r>
             <a:r>
-              <a:rPr lang="en-US" sz="1700">
+              <a:rPr lang="en-US" sz="1700" dirty="0">
                 <a:latin typeface="Courier New" panose="02070309020205020404" pitchFamily="49" charset="0"/>
                 <a:cs typeface="Courier New" panose="02070309020205020404" pitchFamily="49" charset="0"/>
               </a:rPr>
@@ -8372,13 +8376,37 @@
                 <a:spcPct val="80000"/>
               </a:lnSpc>
             </a:pPr>
-            <a:endParaRPr lang="en-US" sz="1700">
+            <a:endParaRPr lang="en-US" sz="1700" dirty="0">
               <a:latin typeface="Courier New" panose="02070309020205020404" pitchFamily="49" charset="0"/>
               <a:cs typeface="Courier New" panose="02070309020205020404" pitchFamily="49" charset="0"/>
             </a:endParaRPr>
           </a:p>
         </p:txBody>
       </p:sp>
+      <p:pic>
+        <p:nvPicPr>
+          <p:cNvPr id="4" name="Picture 3"/>
+          <p:cNvPicPr>
+            <a:picLocks noChangeAspect="1"/>
+          </p:cNvPicPr>
+          <p:nvPr/>
+        </p:nvPicPr>
+        <p:blipFill>
+          <a:blip r:embed="rId2"/>
+          <a:stretch>
+            <a:fillRect/>
+          </a:stretch>
+        </p:blipFill>
+        <p:spPr>
+          <a:xfrm>
+            <a:off x="6093992" y="1703816"/>
+            <a:ext cx="5576931" cy="4011649"/>
+          </a:xfrm>
+          <a:prstGeom prst="rect">
+            <a:avLst/>
+          </a:prstGeom>
+        </p:spPr>
+      </p:pic>
     </p:spTree>
     <p:extLst>
       <p:ext uri="{BB962C8B-B14F-4D97-AF65-F5344CB8AC3E}">

</xml_diff>

<commit_message>
Added notes on slides and slide on extra resources
Also slides in PDF form
</commit_message>
<xml_diff>
--- a/Git 101.pptx
+++ b/Git 101.pptx
@@ -4,6 +4,9 @@
   <p:sldMasterIdLst>
     <p:sldMasterId id="2147483648" r:id="rId1"/>
   </p:sldMasterIdLst>
+  <p:notesMasterIdLst>
+    <p:notesMasterId r:id="rId15"/>
+  </p:notesMasterIdLst>
   <p:sldIdLst>
     <p:sldId id="256" r:id="rId2"/>
     <p:sldId id="257" r:id="rId3"/>
@@ -16,7 +19,8 @@
     <p:sldId id="264" r:id="rId10"/>
     <p:sldId id="265" r:id="rId11"/>
     <p:sldId id="266" r:id="rId12"/>
-    <p:sldId id="267" r:id="rId13"/>
+    <p:sldId id="268" r:id="rId13"/>
+    <p:sldId id="267" r:id="rId14"/>
   </p:sldIdLst>
   <p:sldSz cx="12192000" cy="6858000"/>
   <p:notesSz cx="6858000" cy="9144000"/>
@@ -123,6 +127,1278 @@
 </p:presentation>
 </file>
 
+<file path=ppt/notesMasters/notesMaster1.xml><?xml version="1.0" encoding="utf-8"?>
+<p:notesMaster xmlns:a="http://schemas.openxmlformats.org/drawingml/2006/main" xmlns:r="http://schemas.openxmlformats.org/officeDocument/2006/relationships" xmlns:p="http://schemas.openxmlformats.org/presentationml/2006/main">
+  <p:cSld>
+    <p:bg>
+      <p:bgRef idx="1001">
+        <a:schemeClr val="bg1"/>
+      </p:bgRef>
+    </p:bg>
+    <p:spTree>
+      <p:nvGrpSpPr>
+        <p:cNvPr id="1" name=""/>
+        <p:cNvGrpSpPr/>
+        <p:nvPr/>
+      </p:nvGrpSpPr>
+      <p:grpSpPr>
+        <a:xfrm>
+          <a:off x="0" y="0"/>
+          <a:ext cx="0" cy="0"/>
+          <a:chOff x="0" y="0"/>
+          <a:chExt cx="0" cy="0"/>
+        </a:xfrm>
+      </p:grpSpPr>
+      <p:sp>
+        <p:nvSpPr>
+          <p:cNvPr id="2" name="Header Placeholder 1"/>
+          <p:cNvSpPr>
+            <a:spLocks noGrp="1"/>
+          </p:cNvSpPr>
+          <p:nvPr>
+            <p:ph type="hdr" sz="quarter"/>
+          </p:nvPr>
+        </p:nvSpPr>
+        <p:spPr>
+          <a:xfrm>
+            <a:off x="0" y="0"/>
+            <a:ext cx="2971800" cy="458788"/>
+          </a:xfrm>
+          <a:prstGeom prst="rect">
+            <a:avLst/>
+          </a:prstGeom>
+        </p:spPr>
+        <p:txBody>
+          <a:bodyPr vert="horz" lIns="91440" tIns="45720" rIns="91440" bIns="45720" rtlCol="0"/>
+          <a:lstStyle>
+            <a:lvl1pPr algn="l">
+              <a:defRPr sz="1200"/>
+            </a:lvl1pPr>
+          </a:lstStyle>
+          <a:p>
+            <a:endParaRPr lang="en-US"/>
+          </a:p>
+        </p:txBody>
+      </p:sp>
+      <p:sp>
+        <p:nvSpPr>
+          <p:cNvPr id="3" name="Date Placeholder 2"/>
+          <p:cNvSpPr>
+            <a:spLocks noGrp="1"/>
+          </p:cNvSpPr>
+          <p:nvPr>
+            <p:ph type="dt" idx="1"/>
+          </p:nvPr>
+        </p:nvSpPr>
+        <p:spPr>
+          <a:xfrm>
+            <a:off x="3884613" y="0"/>
+            <a:ext cx="2971800" cy="458788"/>
+          </a:xfrm>
+          <a:prstGeom prst="rect">
+            <a:avLst/>
+          </a:prstGeom>
+        </p:spPr>
+        <p:txBody>
+          <a:bodyPr vert="horz" lIns="91440" tIns="45720" rIns="91440" bIns="45720" rtlCol="0"/>
+          <a:lstStyle>
+            <a:lvl1pPr algn="r">
+              <a:defRPr sz="1200"/>
+            </a:lvl1pPr>
+          </a:lstStyle>
+          <a:p>
+            <a:fld id="{3EEE89EB-8E68-42DA-8C33-79187F154C84}" type="datetimeFigureOut">
+              <a:rPr lang="en-US" smtClean="0"/>
+              <a:t>12/16/2016</a:t>
+            </a:fld>
+            <a:endParaRPr lang="en-US"/>
+          </a:p>
+        </p:txBody>
+      </p:sp>
+      <p:sp>
+        <p:nvSpPr>
+          <p:cNvPr id="4" name="Slide Image Placeholder 3"/>
+          <p:cNvSpPr>
+            <a:spLocks noGrp="1" noRot="1" noChangeAspect="1"/>
+          </p:cNvSpPr>
+          <p:nvPr>
+            <p:ph type="sldImg" idx="2"/>
+          </p:nvPr>
+        </p:nvSpPr>
+        <p:spPr>
+          <a:xfrm>
+            <a:off x="685800" y="1143000"/>
+            <a:ext cx="5486400" cy="3086100"/>
+          </a:xfrm>
+          <a:prstGeom prst="rect">
+            <a:avLst/>
+          </a:prstGeom>
+          <a:noFill/>
+          <a:ln w="12700">
+            <a:solidFill>
+              <a:prstClr val="black"/>
+            </a:solidFill>
+          </a:ln>
+        </p:spPr>
+        <p:txBody>
+          <a:bodyPr vert="horz" lIns="91440" tIns="45720" rIns="91440" bIns="45720" rtlCol="0" anchor="ctr"/>
+          <a:lstStyle/>
+          <a:p>
+            <a:endParaRPr lang="en-US"/>
+          </a:p>
+        </p:txBody>
+      </p:sp>
+      <p:sp>
+        <p:nvSpPr>
+          <p:cNvPr id="5" name="Notes Placeholder 4"/>
+          <p:cNvSpPr>
+            <a:spLocks noGrp="1"/>
+          </p:cNvSpPr>
+          <p:nvPr>
+            <p:ph type="body" sz="quarter" idx="3"/>
+          </p:nvPr>
+        </p:nvSpPr>
+        <p:spPr>
+          <a:xfrm>
+            <a:off x="685800" y="4400550"/>
+            <a:ext cx="5486400" cy="3600450"/>
+          </a:xfrm>
+          <a:prstGeom prst="rect">
+            <a:avLst/>
+          </a:prstGeom>
+        </p:spPr>
+        <p:txBody>
+          <a:bodyPr vert="horz" lIns="91440" tIns="45720" rIns="91440" bIns="45720" rtlCol="0"/>
+          <a:lstStyle/>
+          <a:p>
+            <a:pPr lvl="0"/>
+            <a:r>
+              <a:rPr lang="en-US"/>
+              <a:t>Edit Master text styles</a:t>
+            </a:r>
+          </a:p>
+          <a:p>
+            <a:pPr lvl="1"/>
+            <a:r>
+              <a:rPr lang="en-US"/>
+              <a:t>Second level</a:t>
+            </a:r>
+          </a:p>
+          <a:p>
+            <a:pPr lvl="2"/>
+            <a:r>
+              <a:rPr lang="en-US"/>
+              <a:t>Third level</a:t>
+            </a:r>
+          </a:p>
+          <a:p>
+            <a:pPr lvl="3"/>
+            <a:r>
+              <a:rPr lang="en-US"/>
+              <a:t>Fourth level</a:t>
+            </a:r>
+          </a:p>
+          <a:p>
+            <a:pPr lvl="4"/>
+            <a:r>
+              <a:rPr lang="en-US"/>
+              <a:t>Fifth level</a:t>
+            </a:r>
+            <a:endParaRPr lang="en-US"/>
+          </a:p>
+        </p:txBody>
+      </p:sp>
+      <p:sp>
+        <p:nvSpPr>
+          <p:cNvPr id="6" name="Footer Placeholder 5"/>
+          <p:cNvSpPr>
+            <a:spLocks noGrp="1"/>
+          </p:cNvSpPr>
+          <p:nvPr>
+            <p:ph type="ftr" sz="quarter" idx="4"/>
+          </p:nvPr>
+        </p:nvSpPr>
+        <p:spPr>
+          <a:xfrm>
+            <a:off x="0" y="8685213"/>
+            <a:ext cx="2971800" cy="458787"/>
+          </a:xfrm>
+          <a:prstGeom prst="rect">
+            <a:avLst/>
+          </a:prstGeom>
+        </p:spPr>
+        <p:txBody>
+          <a:bodyPr vert="horz" lIns="91440" tIns="45720" rIns="91440" bIns="45720" rtlCol="0" anchor="b"/>
+          <a:lstStyle>
+            <a:lvl1pPr algn="l">
+              <a:defRPr sz="1200"/>
+            </a:lvl1pPr>
+          </a:lstStyle>
+          <a:p>
+            <a:endParaRPr lang="en-US"/>
+          </a:p>
+        </p:txBody>
+      </p:sp>
+      <p:sp>
+        <p:nvSpPr>
+          <p:cNvPr id="7" name="Slide Number Placeholder 6"/>
+          <p:cNvSpPr>
+            <a:spLocks noGrp="1"/>
+          </p:cNvSpPr>
+          <p:nvPr>
+            <p:ph type="sldNum" sz="quarter" idx="5"/>
+          </p:nvPr>
+        </p:nvSpPr>
+        <p:spPr>
+          <a:xfrm>
+            <a:off x="3884613" y="8685213"/>
+            <a:ext cx="2971800" cy="458787"/>
+          </a:xfrm>
+          <a:prstGeom prst="rect">
+            <a:avLst/>
+          </a:prstGeom>
+        </p:spPr>
+        <p:txBody>
+          <a:bodyPr vert="horz" lIns="91440" tIns="45720" rIns="91440" bIns="45720" rtlCol="0" anchor="b"/>
+          <a:lstStyle>
+            <a:lvl1pPr algn="r">
+              <a:defRPr sz="1200"/>
+            </a:lvl1pPr>
+          </a:lstStyle>
+          <a:p>
+            <a:fld id="{185FB945-B377-4489-BEA0-943980B5D2EB}" type="slidenum">
+              <a:rPr lang="en-US" smtClean="0"/>
+              <a:t>‹#›</a:t>
+            </a:fld>
+            <a:endParaRPr lang="en-US"/>
+          </a:p>
+        </p:txBody>
+      </p:sp>
+    </p:spTree>
+    <p:extLst>
+      <p:ext uri="{BB962C8B-B14F-4D97-AF65-F5344CB8AC3E}">
+        <p14:creationId xmlns:p14="http://schemas.microsoft.com/office/powerpoint/2010/main" val="2314222134"/>
+      </p:ext>
+    </p:extLst>
+  </p:cSld>
+  <p:clrMap bg1="lt1" tx1="dk1" bg2="lt2" tx2="dk2" accent1="accent1" accent2="accent2" accent3="accent3" accent4="accent4" accent5="accent5" accent6="accent6" hlink="hlink" folHlink="folHlink"/>
+  <p:notesStyle>
+    <a:lvl1pPr marL="0" algn="l" defTabSz="914400" rtl="0" eaLnBrk="1" latinLnBrk="0" hangingPunct="1">
+      <a:defRPr sz="1200" kern="1200">
+        <a:solidFill>
+          <a:schemeClr val="tx1"/>
+        </a:solidFill>
+        <a:latin typeface="+mn-lt"/>
+        <a:ea typeface="+mn-ea"/>
+        <a:cs typeface="+mn-cs"/>
+      </a:defRPr>
+    </a:lvl1pPr>
+    <a:lvl2pPr marL="457200" algn="l" defTabSz="914400" rtl="0" eaLnBrk="1" latinLnBrk="0" hangingPunct="1">
+      <a:defRPr sz="1200" kern="1200">
+        <a:solidFill>
+          <a:schemeClr val="tx1"/>
+        </a:solidFill>
+        <a:latin typeface="+mn-lt"/>
+        <a:ea typeface="+mn-ea"/>
+        <a:cs typeface="+mn-cs"/>
+      </a:defRPr>
+    </a:lvl2pPr>
+    <a:lvl3pPr marL="914400" algn="l" defTabSz="914400" rtl="0" eaLnBrk="1" latinLnBrk="0" hangingPunct="1">
+      <a:defRPr sz="1200" kern="1200">
+        <a:solidFill>
+          <a:schemeClr val="tx1"/>
+        </a:solidFill>
+        <a:latin typeface="+mn-lt"/>
+        <a:ea typeface="+mn-ea"/>
+        <a:cs typeface="+mn-cs"/>
+      </a:defRPr>
+    </a:lvl3pPr>
+    <a:lvl4pPr marL="1371600" algn="l" defTabSz="914400" rtl="0" eaLnBrk="1" latinLnBrk="0" hangingPunct="1">
+      <a:defRPr sz="1200" kern="1200">
+        <a:solidFill>
+          <a:schemeClr val="tx1"/>
+        </a:solidFill>
+        <a:latin typeface="+mn-lt"/>
+        <a:ea typeface="+mn-ea"/>
+        <a:cs typeface="+mn-cs"/>
+      </a:defRPr>
+    </a:lvl4pPr>
+    <a:lvl5pPr marL="1828800" algn="l" defTabSz="914400" rtl="0" eaLnBrk="1" latinLnBrk="0" hangingPunct="1">
+      <a:defRPr sz="1200" kern="1200">
+        <a:solidFill>
+          <a:schemeClr val="tx1"/>
+        </a:solidFill>
+        <a:latin typeface="+mn-lt"/>
+        <a:ea typeface="+mn-ea"/>
+        <a:cs typeface="+mn-cs"/>
+      </a:defRPr>
+    </a:lvl5pPr>
+    <a:lvl6pPr marL="2286000" algn="l" defTabSz="914400" rtl="0" eaLnBrk="1" latinLnBrk="0" hangingPunct="1">
+      <a:defRPr sz="1200" kern="1200">
+        <a:solidFill>
+          <a:schemeClr val="tx1"/>
+        </a:solidFill>
+        <a:latin typeface="+mn-lt"/>
+        <a:ea typeface="+mn-ea"/>
+        <a:cs typeface="+mn-cs"/>
+      </a:defRPr>
+    </a:lvl6pPr>
+    <a:lvl7pPr marL="2743200" algn="l" defTabSz="914400" rtl="0" eaLnBrk="1" latinLnBrk="0" hangingPunct="1">
+      <a:defRPr sz="1200" kern="1200">
+        <a:solidFill>
+          <a:schemeClr val="tx1"/>
+        </a:solidFill>
+        <a:latin typeface="+mn-lt"/>
+        <a:ea typeface="+mn-ea"/>
+        <a:cs typeface="+mn-cs"/>
+      </a:defRPr>
+    </a:lvl7pPr>
+    <a:lvl8pPr marL="3200400" algn="l" defTabSz="914400" rtl="0" eaLnBrk="1" latinLnBrk="0" hangingPunct="1">
+      <a:defRPr sz="1200" kern="1200">
+        <a:solidFill>
+          <a:schemeClr val="tx1"/>
+        </a:solidFill>
+        <a:latin typeface="+mn-lt"/>
+        <a:ea typeface="+mn-ea"/>
+        <a:cs typeface="+mn-cs"/>
+      </a:defRPr>
+    </a:lvl8pPr>
+    <a:lvl9pPr marL="3657600" algn="l" defTabSz="914400" rtl="0" eaLnBrk="1" latinLnBrk="0" hangingPunct="1">
+      <a:defRPr sz="1200" kern="1200">
+        <a:solidFill>
+          <a:schemeClr val="tx1"/>
+        </a:solidFill>
+        <a:latin typeface="+mn-lt"/>
+        <a:ea typeface="+mn-ea"/>
+        <a:cs typeface="+mn-cs"/>
+      </a:defRPr>
+    </a:lvl9pPr>
+  </p:notesStyle>
+</p:notesMaster>
+</file>
+
+<file path=ppt/notesSlides/notesSlide1.xml><?xml version="1.0" encoding="utf-8"?>
+<p:notes xmlns:a="http://schemas.openxmlformats.org/drawingml/2006/main" xmlns:r="http://schemas.openxmlformats.org/officeDocument/2006/relationships" xmlns:p="http://schemas.openxmlformats.org/presentationml/2006/main">
+  <p:cSld>
+    <p:spTree>
+      <p:nvGrpSpPr>
+        <p:cNvPr id="1" name=""/>
+        <p:cNvGrpSpPr/>
+        <p:nvPr/>
+      </p:nvGrpSpPr>
+      <p:grpSpPr>
+        <a:xfrm>
+          <a:off x="0" y="0"/>
+          <a:ext cx="0" cy="0"/>
+          <a:chOff x="0" y="0"/>
+          <a:chExt cx="0" cy="0"/>
+        </a:xfrm>
+      </p:grpSpPr>
+      <p:sp>
+        <p:nvSpPr>
+          <p:cNvPr id="2" name="Slide Image Placeholder 1"/>
+          <p:cNvSpPr>
+            <a:spLocks noGrp="1" noRot="1" noChangeAspect="1"/>
+          </p:cNvSpPr>
+          <p:nvPr>
+            <p:ph type="sldImg"/>
+          </p:nvPr>
+        </p:nvSpPr>
+        <p:spPr/>
+      </p:sp>
+      <p:sp>
+        <p:nvSpPr>
+          <p:cNvPr id="3" name="Notes Placeholder 2"/>
+          <p:cNvSpPr>
+            <a:spLocks noGrp="1"/>
+          </p:cNvSpPr>
+          <p:nvPr>
+            <p:ph type="body" idx="1"/>
+          </p:nvPr>
+        </p:nvSpPr>
+        <p:spPr/>
+        <p:txBody>
+          <a:bodyPr/>
+          <a:lstStyle/>
+          <a:p>
+            <a:r>
+              <a:rPr lang="en-US" dirty="0"/>
+              <a:t>Quick</a:t>
+            </a:r>
+            <a:r>
+              <a:rPr lang="en-US" baseline="0" dirty="0"/>
+              <a:t> slide, highlight how </a:t>
+            </a:r>
+            <a:r>
+              <a:rPr lang="en-US" baseline="0" dirty="0" err="1"/>
+              <a:t>Git</a:t>
+            </a:r>
+            <a:r>
+              <a:rPr lang="en-US" baseline="0" dirty="0"/>
+              <a:t> came to be and its origins.</a:t>
+            </a:r>
+            <a:endParaRPr lang="en-US" dirty="0"/>
+          </a:p>
+        </p:txBody>
+      </p:sp>
+      <p:sp>
+        <p:nvSpPr>
+          <p:cNvPr id="4" name="Slide Number Placeholder 3"/>
+          <p:cNvSpPr>
+            <a:spLocks noGrp="1"/>
+          </p:cNvSpPr>
+          <p:nvPr>
+            <p:ph type="sldNum" sz="quarter" idx="10"/>
+          </p:nvPr>
+        </p:nvSpPr>
+        <p:spPr/>
+        <p:txBody>
+          <a:bodyPr/>
+          <a:lstStyle/>
+          <a:p>
+            <a:fld id="{185FB945-B377-4489-BEA0-943980B5D2EB}" type="slidenum">
+              <a:rPr lang="en-US" smtClean="0"/>
+              <a:t>3</a:t>
+            </a:fld>
+            <a:endParaRPr lang="en-US"/>
+          </a:p>
+        </p:txBody>
+      </p:sp>
+    </p:spTree>
+    <p:extLst>
+      <p:ext uri="{BB962C8B-B14F-4D97-AF65-F5344CB8AC3E}">
+        <p14:creationId xmlns:p14="http://schemas.microsoft.com/office/powerpoint/2010/main" val="1149626361"/>
+      </p:ext>
+    </p:extLst>
+  </p:cSld>
+  <p:clrMapOvr>
+    <a:masterClrMapping/>
+  </p:clrMapOvr>
+</p:notes>
+</file>
+
+<file path=ppt/notesSlides/notesSlide10.xml><?xml version="1.0" encoding="utf-8"?>
+<p:notes xmlns:a="http://schemas.openxmlformats.org/drawingml/2006/main" xmlns:r="http://schemas.openxmlformats.org/officeDocument/2006/relationships" xmlns:p="http://schemas.openxmlformats.org/presentationml/2006/main">
+  <p:cSld>
+    <p:spTree>
+      <p:nvGrpSpPr>
+        <p:cNvPr id="1" name=""/>
+        <p:cNvGrpSpPr/>
+        <p:nvPr/>
+      </p:nvGrpSpPr>
+      <p:grpSpPr>
+        <a:xfrm>
+          <a:off x="0" y="0"/>
+          <a:ext cx="0" cy="0"/>
+          <a:chOff x="0" y="0"/>
+          <a:chExt cx="0" cy="0"/>
+        </a:xfrm>
+      </p:grpSpPr>
+      <p:sp>
+        <p:nvSpPr>
+          <p:cNvPr id="2" name="Slide Image Placeholder 1"/>
+          <p:cNvSpPr>
+            <a:spLocks noGrp="1" noRot="1" noChangeAspect="1"/>
+          </p:cNvSpPr>
+          <p:nvPr>
+            <p:ph type="sldImg"/>
+          </p:nvPr>
+        </p:nvSpPr>
+        <p:spPr/>
+      </p:sp>
+      <p:sp>
+        <p:nvSpPr>
+          <p:cNvPr id="3" name="Notes Placeholder 2"/>
+          <p:cNvSpPr>
+            <a:spLocks noGrp="1"/>
+          </p:cNvSpPr>
+          <p:nvPr>
+            <p:ph type="body" idx="1"/>
+          </p:nvPr>
+        </p:nvSpPr>
+        <p:spPr/>
+        <p:txBody>
+          <a:bodyPr/>
+          <a:lstStyle/>
+          <a:p>
+            <a:endParaRPr lang="en-US"/>
+          </a:p>
+        </p:txBody>
+      </p:sp>
+      <p:sp>
+        <p:nvSpPr>
+          <p:cNvPr id="4" name="Slide Number Placeholder 3"/>
+          <p:cNvSpPr>
+            <a:spLocks noGrp="1"/>
+          </p:cNvSpPr>
+          <p:nvPr>
+            <p:ph type="sldNum" sz="quarter" idx="10"/>
+          </p:nvPr>
+        </p:nvSpPr>
+        <p:spPr/>
+        <p:txBody>
+          <a:bodyPr/>
+          <a:lstStyle/>
+          <a:p>
+            <a:fld id="{185FB945-B377-4489-BEA0-943980B5D2EB}" type="slidenum">
+              <a:rPr lang="en-US" smtClean="0"/>
+              <a:t>12</a:t>
+            </a:fld>
+            <a:endParaRPr lang="en-US"/>
+          </a:p>
+        </p:txBody>
+      </p:sp>
+    </p:spTree>
+    <p:extLst>
+      <p:ext uri="{BB962C8B-B14F-4D97-AF65-F5344CB8AC3E}">
+        <p14:creationId xmlns:p14="http://schemas.microsoft.com/office/powerpoint/2010/main" val="1065915728"/>
+      </p:ext>
+    </p:extLst>
+  </p:cSld>
+  <p:clrMapOvr>
+    <a:masterClrMapping/>
+  </p:clrMapOvr>
+</p:notes>
+</file>
+
+<file path=ppt/notesSlides/notesSlide2.xml><?xml version="1.0" encoding="utf-8"?>
+<p:notes xmlns:a="http://schemas.openxmlformats.org/drawingml/2006/main" xmlns:r="http://schemas.openxmlformats.org/officeDocument/2006/relationships" xmlns:p="http://schemas.openxmlformats.org/presentationml/2006/main">
+  <p:cSld>
+    <p:spTree>
+      <p:nvGrpSpPr>
+        <p:cNvPr id="1" name=""/>
+        <p:cNvGrpSpPr/>
+        <p:nvPr/>
+      </p:nvGrpSpPr>
+      <p:grpSpPr>
+        <a:xfrm>
+          <a:off x="0" y="0"/>
+          <a:ext cx="0" cy="0"/>
+          <a:chOff x="0" y="0"/>
+          <a:chExt cx="0" cy="0"/>
+        </a:xfrm>
+      </p:grpSpPr>
+      <p:sp>
+        <p:nvSpPr>
+          <p:cNvPr id="2" name="Slide Image Placeholder 1"/>
+          <p:cNvSpPr>
+            <a:spLocks noGrp="1" noRot="1" noChangeAspect="1"/>
+          </p:cNvSpPr>
+          <p:nvPr>
+            <p:ph type="sldImg"/>
+          </p:nvPr>
+        </p:nvSpPr>
+        <p:spPr/>
+      </p:sp>
+      <p:sp>
+        <p:nvSpPr>
+          <p:cNvPr id="3" name="Notes Placeholder 2"/>
+          <p:cNvSpPr>
+            <a:spLocks noGrp="1"/>
+          </p:cNvSpPr>
+          <p:nvPr>
+            <p:ph type="body" idx="1"/>
+          </p:nvPr>
+        </p:nvSpPr>
+        <p:spPr/>
+        <p:txBody>
+          <a:bodyPr/>
+          <a:lstStyle/>
+          <a:p>
+            <a:r>
+              <a:rPr lang="en-US" dirty="0"/>
+              <a:t>Break here to go through a live demonstration</a:t>
+            </a:r>
+            <a:r>
+              <a:rPr lang="en-US" baseline="0" dirty="0"/>
+              <a:t> of each of these commands.</a:t>
+            </a:r>
+            <a:endParaRPr lang="en-US" dirty="0"/>
+          </a:p>
+        </p:txBody>
+      </p:sp>
+      <p:sp>
+        <p:nvSpPr>
+          <p:cNvPr id="4" name="Slide Number Placeholder 3"/>
+          <p:cNvSpPr>
+            <a:spLocks noGrp="1"/>
+          </p:cNvSpPr>
+          <p:nvPr>
+            <p:ph type="sldNum" sz="quarter" idx="10"/>
+          </p:nvPr>
+        </p:nvSpPr>
+        <p:spPr/>
+        <p:txBody>
+          <a:bodyPr/>
+          <a:lstStyle/>
+          <a:p>
+            <a:fld id="{185FB945-B377-4489-BEA0-943980B5D2EB}" type="slidenum">
+              <a:rPr lang="en-US" smtClean="0"/>
+              <a:t>4</a:t>
+            </a:fld>
+            <a:endParaRPr lang="en-US"/>
+          </a:p>
+        </p:txBody>
+      </p:sp>
+    </p:spTree>
+    <p:extLst>
+      <p:ext uri="{BB962C8B-B14F-4D97-AF65-F5344CB8AC3E}">
+        <p14:creationId xmlns:p14="http://schemas.microsoft.com/office/powerpoint/2010/main" val="813676507"/>
+      </p:ext>
+    </p:extLst>
+  </p:cSld>
+  <p:clrMapOvr>
+    <a:masterClrMapping/>
+  </p:clrMapOvr>
+</p:notes>
+</file>
+
+<file path=ppt/notesSlides/notesSlide3.xml><?xml version="1.0" encoding="utf-8"?>
+<p:notes xmlns:a="http://schemas.openxmlformats.org/drawingml/2006/main" xmlns:r="http://schemas.openxmlformats.org/officeDocument/2006/relationships" xmlns:p="http://schemas.openxmlformats.org/presentationml/2006/main">
+  <p:cSld>
+    <p:spTree>
+      <p:nvGrpSpPr>
+        <p:cNvPr id="1" name=""/>
+        <p:cNvGrpSpPr/>
+        <p:nvPr/>
+      </p:nvGrpSpPr>
+      <p:grpSpPr>
+        <a:xfrm>
+          <a:off x="0" y="0"/>
+          <a:ext cx="0" cy="0"/>
+          <a:chOff x="0" y="0"/>
+          <a:chExt cx="0" cy="0"/>
+        </a:xfrm>
+      </p:grpSpPr>
+      <p:sp>
+        <p:nvSpPr>
+          <p:cNvPr id="2" name="Slide Image Placeholder 1"/>
+          <p:cNvSpPr>
+            <a:spLocks noGrp="1" noRot="1" noChangeAspect="1"/>
+          </p:cNvSpPr>
+          <p:nvPr>
+            <p:ph type="sldImg"/>
+          </p:nvPr>
+        </p:nvSpPr>
+        <p:spPr/>
+      </p:sp>
+      <p:sp>
+        <p:nvSpPr>
+          <p:cNvPr id="3" name="Notes Placeholder 2"/>
+          <p:cNvSpPr>
+            <a:spLocks noGrp="1"/>
+          </p:cNvSpPr>
+          <p:nvPr>
+            <p:ph type="body" idx="1"/>
+          </p:nvPr>
+        </p:nvSpPr>
+        <p:spPr/>
+        <p:txBody>
+          <a:bodyPr/>
+          <a:lstStyle/>
+          <a:p>
+            <a:r>
+              <a:rPr lang="en-US" dirty="0"/>
+              <a:t>Stress that learning how to use </a:t>
+            </a:r>
+            <a:r>
+              <a:rPr lang="en-US" dirty="0" err="1"/>
+              <a:t>Git</a:t>
+            </a:r>
+            <a:r>
+              <a:rPr lang="en-US" baseline="0" dirty="0"/>
+              <a:t> on a command line is a must before using graphical clients, as if something screws up on the client one can fall back to the command line.</a:t>
+            </a:r>
+            <a:endParaRPr lang="en-US" dirty="0"/>
+          </a:p>
+        </p:txBody>
+      </p:sp>
+      <p:sp>
+        <p:nvSpPr>
+          <p:cNvPr id="4" name="Slide Number Placeholder 3"/>
+          <p:cNvSpPr>
+            <a:spLocks noGrp="1"/>
+          </p:cNvSpPr>
+          <p:nvPr>
+            <p:ph type="sldNum" sz="quarter" idx="10"/>
+          </p:nvPr>
+        </p:nvSpPr>
+        <p:spPr/>
+        <p:txBody>
+          <a:bodyPr/>
+          <a:lstStyle/>
+          <a:p>
+            <a:fld id="{185FB945-B377-4489-BEA0-943980B5D2EB}" type="slidenum">
+              <a:rPr lang="en-US" smtClean="0"/>
+              <a:t>5</a:t>
+            </a:fld>
+            <a:endParaRPr lang="en-US"/>
+          </a:p>
+        </p:txBody>
+      </p:sp>
+    </p:spTree>
+    <p:extLst>
+      <p:ext uri="{BB962C8B-B14F-4D97-AF65-F5344CB8AC3E}">
+        <p14:creationId xmlns:p14="http://schemas.microsoft.com/office/powerpoint/2010/main" val="2585610047"/>
+      </p:ext>
+    </p:extLst>
+  </p:cSld>
+  <p:clrMapOvr>
+    <a:masterClrMapping/>
+  </p:clrMapOvr>
+</p:notes>
+</file>
+
+<file path=ppt/notesSlides/notesSlide4.xml><?xml version="1.0" encoding="utf-8"?>
+<p:notes xmlns:a="http://schemas.openxmlformats.org/drawingml/2006/main" xmlns:r="http://schemas.openxmlformats.org/officeDocument/2006/relationships" xmlns:p="http://schemas.openxmlformats.org/presentationml/2006/main">
+  <p:cSld>
+    <p:spTree>
+      <p:nvGrpSpPr>
+        <p:cNvPr id="1" name=""/>
+        <p:cNvGrpSpPr/>
+        <p:nvPr/>
+      </p:nvGrpSpPr>
+      <p:grpSpPr>
+        <a:xfrm>
+          <a:off x="0" y="0"/>
+          <a:ext cx="0" cy="0"/>
+          <a:chOff x="0" y="0"/>
+          <a:chExt cx="0" cy="0"/>
+        </a:xfrm>
+      </p:grpSpPr>
+      <p:sp>
+        <p:nvSpPr>
+          <p:cNvPr id="2" name="Slide Image Placeholder 1"/>
+          <p:cNvSpPr>
+            <a:spLocks noGrp="1" noRot="1" noChangeAspect="1"/>
+          </p:cNvSpPr>
+          <p:nvPr>
+            <p:ph type="sldImg"/>
+          </p:nvPr>
+        </p:nvSpPr>
+        <p:spPr/>
+      </p:sp>
+      <p:sp>
+        <p:nvSpPr>
+          <p:cNvPr id="3" name="Notes Placeholder 2"/>
+          <p:cNvSpPr>
+            <a:spLocks noGrp="1"/>
+          </p:cNvSpPr>
+          <p:nvPr>
+            <p:ph type="body" idx="1"/>
+          </p:nvPr>
+        </p:nvSpPr>
+        <p:spPr/>
+        <p:txBody>
+          <a:bodyPr/>
+          <a:lstStyle/>
+          <a:p>
+            <a:r>
+              <a:rPr lang="en-US" dirty="0"/>
+              <a:t>A situation that many people might run into, hence a few slides on it.</a:t>
+            </a:r>
+          </a:p>
+        </p:txBody>
+      </p:sp>
+      <p:sp>
+        <p:nvSpPr>
+          <p:cNvPr id="4" name="Slide Number Placeholder 3"/>
+          <p:cNvSpPr>
+            <a:spLocks noGrp="1"/>
+          </p:cNvSpPr>
+          <p:nvPr>
+            <p:ph type="sldNum" sz="quarter" idx="10"/>
+          </p:nvPr>
+        </p:nvSpPr>
+        <p:spPr/>
+        <p:txBody>
+          <a:bodyPr/>
+          <a:lstStyle/>
+          <a:p>
+            <a:fld id="{185FB945-B377-4489-BEA0-943980B5D2EB}" type="slidenum">
+              <a:rPr lang="en-US" smtClean="0"/>
+              <a:t>6</a:t>
+            </a:fld>
+            <a:endParaRPr lang="en-US"/>
+          </a:p>
+        </p:txBody>
+      </p:sp>
+    </p:spTree>
+    <p:extLst>
+      <p:ext uri="{BB962C8B-B14F-4D97-AF65-F5344CB8AC3E}">
+        <p14:creationId xmlns:p14="http://schemas.microsoft.com/office/powerpoint/2010/main" val="2204510041"/>
+      </p:ext>
+    </p:extLst>
+  </p:cSld>
+  <p:clrMapOvr>
+    <a:masterClrMapping/>
+  </p:clrMapOvr>
+</p:notes>
+</file>
+
+<file path=ppt/notesSlides/notesSlide5.xml><?xml version="1.0" encoding="utf-8"?>
+<p:notes xmlns:a="http://schemas.openxmlformats.org/drawingml/2006/main" xmlns:r="http://schemas.openxmlformats.org/officeDocument/2006/relationships" xmlns:p="http://schemas.openxmlformats.org/presentationml/2006/main">
+  <p:cSld>
+    <p:spTree>
+      <p:nvGrpSpPr>
+        <p:cNvPr id="1" name=""/>
+        <p:cNvGrpSpPr/>
+        <p:nvPr/>
+      </p:nvGrpSpPr>
+      <p:grpSpPr>
+        <a:xfrm>
+          <a:off x="0" y="0"/>
+          <a:ext cx="0" cy="0"/>
+          <a:chOff x="0" y="0"/>
+          <a:chExt cx="0" cy="0"/>
+        </a:xfrm>
+      </p:grpSpPr>
+      <p:sp>
+        <p:nvSpPr>
+          <p:cNvPr id="2" name="Slide Image Placeholder 1"/>
+          <p:cNvSpPr>
+            <a:spLocks noGrp="1" noRot="1" noChangeAspect="1"/>
+          </p:cNvSpPr>
+          <p:nvPr>
+            <p:ph type="sldImg"/>
+          </p:nvPr>
+        </p:nvSpPr>
+        <p:spPr/>
+      </p:sp>
+      <p:sp>
+        <p:nvSpPr>
+          <p:cNvPr id="3" name="Notes Placeholder 2"/>
+          <p:cNvSpPr>
+            <a:spLocks noGrp="1"/>
+          </p:cNvSpPr>
+          <p:nvPr>
+            <p:ph type="body" idx="1"/>
+          </p:nvPr>
+        </p:nvSpPr>
+        <p:spPr/>
+        <p:txBody>
+          <a:bodyPr/>
+          <a:lstStyle/>
+          <a:p>
+            <a:r>
+              <a:rPr lang="en-US" dirty="0"/>
+              <a:t>Self explanatory.</a:t>
+            </a:r>
+          </a:p>
+        </p:txBody>
+      </p:sp>
+      <p:sp>
+        <p:nvSpPr>
+          <p:cNvPr id="4" name="Slide Number Placeholder 3"/>
+          <p:cNvSpPr>
+            <a:spLocks noGrp="1"/>
+          </p:cNvSpPr>
+          <p:nvPr>
+            <p:ph type="sldNum" sz="quarter" idx="10"/>
+          </p:nvPr>
+        </p:nvSpPr>
+        <p:spPr/>
+        <p:txBody>
+          <a:bodyPr/>
+          <a:lstStyle/>
+          <a:p>
+            <a:fld id="{185FB945-B377-4489-BEA0-943980B5D2EB}" type="slidenum">
+              <a:rPr lang="en-US" smtClean="0"/>
+              <a:t>7</a:t>
+            </a:fld>
+            <a:endParaRPr lang="en-US"/>
+          </a:p>
+        </p:txBody>
+      </p:sp>
+    </p:spTree>
+    <p:extLst>
+      <p:ext uri="{BB962C8B-B14F-4D97-AF65-F5344CB8AC3E}">
+        <p14:creationId xmlns:p14="http://schemas.microsoft.com/office/powerpoint/2010/main" val="4044277193"/>
+      </p:ext>
+    </p:extLst>
+  </p:cSld>
+  <p:clrMapOvr>
+    <a:masterClrMapping/>
+  </p:clrMapOvr>
+</p:notes>
+</file>
+
+<file path=ppt/notesSlides/notesSlide6.xml><?xml version="1.0" encoding="utf-8"?>
+<p:notes xmlns:a="http://schemas.openxmlformats.org/drawingml/2006/main" xmlns:r="http://schemas.openxmlformats.org/officeDocument/2006/relationships" xmlns:p="http://schemas.openxmlformats.org/presentationml/2006/main">
+  <p:cSld>
+    <p:spTree>
+      <p:nvGrpSpPr>
+        <p:cNvPr id="1" name=""/>
+        <p:cNvGrpSpPr/>
+        <p:nvPr/>
+      </p:nvGrpSpPr>
+      <p:grpSpPr>
+        <a:xfrm>
+          <a:off x="0" y="0"/>
+          <a:ext cx="0" cy="0"/>
+          <a:chOff x="0" y="0"/>
+          <a:chExt cx="0" cy="0"/>
+        </a:xfrm>
+      </p:grpSpPr>
+      <p:sp>
+        <p:nvSpPr>
+          <p:cNvPr id="2" name="Slide Image Placeholder 1"/>
+          <p:cNvSpPr>
+            <a:spLocks noGrp="1" noRot="1" noChangeAspect="1"/>
+          </p:cNvSpPr>
+          <p:nvPr>
+            <p:ph type="sldImg"/>
+          </p:nvPr>
+        </p:nvSpPr>
+        <p:spPr/>
+      </p:sp>
+      <p:sp>
+        <p:nvSpPr>
+          <p:cNvPr id="3" name="Notes Placeholder 2"/>
+          <p:cNvSpPr>
+            <a:spLocks noGrp="1"/>
+          </p:cNvSpPr>
+          <p:nvPr>
+            <p:ph type="body" idx="1"/>
+          </p:nvPr>
+        </p:nvSpPr>
+        <p:spPr/>
+        <p:txBody>
+          <a:bodyPr/>
+          <a:lstStyle/>
+          <a:p>
+            <a:r>
+              <a:rPr lang="en-US" dirty="0"/>
+              <a:t>Live demonstration</a:t>
+            </a:r>
+            <a:r>
+              <a:rPr lang="en-US" baseline="0" dirty="0"/>
+              <a:t> of resolving a merge conflict here. Also highlight that if worse comes to worse, making a backup of code and nuking the local repo is fine too.</a:t>
+            </a:r>
+            <a:endParaRPr lang="en-US" dirty="0"/>
+          </a:p>
+        </p:txBody>
+      </p:sp>
+      <p:sp>
+        <p:nvSpPr>
+          <p:cNvPr id="4" name="Slide Number Placeholder 3"/>
+          <p:cNvSpPr>
+            <a:spLocks noGrp="1"/>
+          </p:cNvSpPr>
+          <p:nvPr>
+            <p:ph type="sldNum" sz="quarter" idx="10"/>
+          </p:nvPr>
+        </p:nvSpPr>
+        <p:spPr/>
+        <p:txBody>
+          <a:bodyPr/>
+          <a:lstStyle/>
+          <a:p>
+            <a:fld id="{185FB945-B377-4489-BEA0-943980B5D2EB}" type="slidenum">
+              <a:rPr lang="en-US" smtClean="0"/>
+              <a:t>8</a:t>
+            </a:fld>
+            <a:endParaRPr lang="en-US"/>
+          </a:p>
+        </p:txBody>
+      </p:sp>
+    </p:spTree>
+    <p:extLst>
+      <p:ext uri="{BB962C8B-B14F-4D97-AF65-F5344CB8AC3E}">
+        <p14:creationId xmlns:p14="http://schemas.microsoft.com/office/powerpoint/2010/main" val="2634875282"/>
+      </p:ext>
+    </p:extLst>
+  </p:cSld>
+  <p:clrMapOvr>
+    <a:masterClrMapping/>
+  </p:clrMapOvr>
+</p:notes>
+</file>
+
+<file path=ppt/notesSlides/notesSlide7.xml><?xml version="1.0" encoding="utf-8"?>
+<p:notes xmlns:a="http://schemas.openxmlformats.org/drawingml/2006/main" xmlns:r="http://schemas.openxmlformats.org/officeDocument/2006/relationships" xmlns:p="http://schemas.openxmlformats.org/presentationml/2006/main">
+  <p:cSld>
+    <p:spTree>
+      <p:nvGrpSpPr>
+        <p:cNvPr id="1" name=""/>
+        <p:cNvGrpSpPr/>
+        <p:nvPr/>
+      </p:nvGrpSpPr>
+      <p:grpSpPr>
+        <a:xfrm>
+          <a:off x="0" y="0"/>
+          <a:ext cx="0" cy="0"/>
+          <a:chOff x="0" y="0"/>
+          <a:chExt cx="0" cy="0"/>
+        </a:xfrm>
+      </p:grpSpPr>
+      <p:sp>
+        <p:nvSpPr>
+          <p:cNvPr id="2" name="Slide Image Placeholder 1"/>
+          <p:cNvSpPr>
+            <a:spLocks noGrp="1" noRot="1" noChangeAspect="1"/>
+          </p:cNvSpPr>
+          <p:nvPr>
+            <p:ph type="sldImg"/>
+          </p:nvPr>
+        </p:nvSpPr>
+        <p:spPr/>
+      </p:sp>
+      <p:sp>
+        <p:nvSpPr>
+          <p:cNvPr id="3" name="Notes Placeholder 2"/>
+          <p:cNvSpPr>
+            <a:spLocks noGrp="1"/>
+          </p:cNvSpPr>
+          <p:nvPr>
+            <p:ph type="body" idx="1"/>
+          </p:nvPr>
+        </p:nvSpPr>
+        <p:spPr/>
+        <p:txBody>
+          <a:bodyPr/>
+          <a:lstStyle/>
+          <a:p>
+            <a:r>
+              <a:rPr lang="en-US" dirty="0"/>
+              <a:t>Because people</a:t>
+            </a:r>
+            <a:r>
+              <a:rPr lang="en-US" baseline="0" dirty="0"/>
+              <a:t> really don’t use this resource enough!</a:t>
+            </a:r>
+            <a:endParaRPr lang="en-US" dirty="0"/>
+          </a:p>
+        </p:txBody>
+      </p:sp>
+      <p:sp>
+        <p:nvSpPr>
+          <p:cNvPr id="4" name="Slide Number Placeholder 3"/>
+          <p:cNvSpPr>
+            <a:spLocks noGrp="1"/>
+          </p:cNvSpPr>
+          <p:nvPr>
+            <p:ph type="sldNum" sz="quarter" idx="10"/>
+          </p:nvPr>
+        </p:nvSpPr>
+        <p:spPr/>
+        <p:txBody>
+          <a:bodyPr/>
+          <a:lstStyle/>
+          <a:p>
+            <a:fld id="{185FB945-B377-4489-BEA0-943980B5D2EB}" type="slidenum">
+              <a:rPr lang="en-US" smtClean="0"/>
+              <a:t>9</a:t>
+            </a:fld>
+            <a:endParaRPr lang="en-US"/>
+          </a:p>
+        </p:txBody>
+      </p:sp>
+    </p:spTree>
+    <p:extLst>
+      <p:ext uri="{BB962C8B-B14F-4D97-AF65-F5344CB8AC3E}">
+        <p14:creationId xmlns:p14="http://schemas.microsoft.com/office/powerpoint/2010/main" val="3585881591"/>
+      </p:ext>
+    </p:extLst>
+  </p:cSld>
+  <p:clrMapOvr>
+    <a:masterClrMapping/>
+  </p:clrMapOvr>
+</p:notes>
+</file>
+
+<file path=ppt/notesSlides/notesSlide8.xml><?xml version="1.0" encoding="utf-8"?>
+<p:notes xmlns:a="http://schemas.openxmlformats.org/drawingml/2006/main" xmlns:r="http://schemas.openxmlformats.org/officeDocument/2006/relationships" xmlns:p="http://schemas.openxmlformats.org/presentationml/2006/main">
+  <p:cSld>
+    <p:spTree>
+      <p:nvGrpSpPr>
+        <p:cNvPr id="1" name=""/>
+        <p:cNvGrpSpPr/>
+        <p:nvPr/>
+      </p:nvGrpSpPr>
+      <p:grpSpPr>
+        <a:xfrm>
+          <a:off x="0" y="0"/>
+          <a:ext cx="0" cy="0"/>
+          <a:chOff x="0" y="0"/>
+          <a:chExt cx="0" cy="0"/>
+        </a:xfrm>
+      </p:grpSpPr>
+      <p:sp>
+        <p:nvSpPr>
+          <p:cNvPr id="2" name="Slide Image Placeholder 1"/>
+          <p:cNvSpPr>
+            <a:spLocks noGrp="1" noRot="1" noChangeAspect="1"/>
+          </p:cNvSpPr>
+          <p:nvPr>
+            <p:ph type="sldImg"/>
+          </p:nvPr>
+        </p:nvSpPr>
+        <p:spPr/>
+      </p:sp>
+      <p:sp>
+        <p:nvSpPr>
+          <p:cNvPr id="3" name="Notes Placeholder 2"/>
+          <p:cNvSpPr>
+            <a:spLocks noGrp="1"/>
+          </p:cNvSpPr>
+          <p:nvPr>
+            <p:ph type="body" idx="1"/>
+          </p:nvPr>
+        </p:nvSpPr>
+        <p:spPr/>
+        <p:txBody>
+          <a:bodyPr/>
+          <a:lstStyle/>
+          <a:p>
+            <a:r>
+              <a:rPr lang="en-US" dirty="0"/>
+              <a:t>Basically</a:t>
+            </a:r>
+            <a:r>
+              <a:rPr lang="en-US" baseline="0" dirty="0"/>
+              <a:t> what this whole presentation is for. Make note that this is only one of many ways to do this.</a:t>
+            </a:r>
+            <a:endParaRPr lang="en-US" dirty="0"/>
+          </a:p>
+        </p:txBody>
+      </p:sp>
+      <p:sp>
+        <p:nvSpPr>
+          <p:cNvPr id="4" name="Slide Number Placeholder 3"/>
+          <p:cNvSpPr>
+            <a:spLocks noGrp="1"/>
+          </p:cNvSpPr>
+          <p:nvPr>
+            <p:ph type="sldNum" sz="quarter" idx="10"/>
+          </p:nvPr>
+        </p:nvSpPr>
+        <p:spPr/>
+        <p:txBody>
+          <a:bodyPr/>
+          <a:lstStyle/>
+          <a:p>
+            <a:fld id="{185FB945-B377-4489-BEA0-943980B5D2EB}" type="slidenum">
+              <a:rPr lang="en-US" smtClean="0"/>
+              <a:t>10</a:t>
+            </a:fld>
+            <a:endParaRPr lang="en-US"/>
+          </a:p>
+        </p:txBody>
+      </p:sp>
+    </p:spTree>
+    <p:extLst>
+      <p:ext uri="{BB962C8B-B14F-4D97-AF65-F5344CB8AC3E}">
+        <p14:creationId xmlns:p14="http://schemas.microsoft.com/office/powerpoint/2010/main" val="3039788151"/>
+      </p:ext>
+    </p:extLst>
+  </p:cSld>
+  <p:clrMapOvr>
+    <a:masterClrMapping/>
+  </p:clrMapOvr>
+</p:notes>
+</file>
+
+<file path=ppt/notesSlides/notesSlide9.xml><?xml version="1.0" encoding="utf-8"?>
+<p:notes xmlns:a="http://schemas.openxmlformats.org/drawingml/2006/main" xmlns:r="http://schemas.openxmlformats.org/officeDocument/2006/relationships" xmlns:p="http://schemas.openxmlformats.org/presentationml/2006/main">
+  <p:cSld>
+    <p:spTree>
+      <p:nvGrpSpPr>
+        <p:cNvPr id="1" name=""/>
+        <p:cNvGrpSpPr/>
+        <p:nvPr/>
+      </p:nvGrpSpPr>
+      <p:grpSpPr>
+        <a:xfrm>
+          <a:off x="0" y="0"/>
+          <a:ext cx="0" cy="0"/>
+          <a:chOff x="0" y="0"/>
+          <a:chExt cx="0" cy="0"/>
+        </a:xfrm>
+      </p:grpSpPr>
+      <p:sp>
+        <p:nvSpPr>
+          <p:cNvPr id="2" name="Slide Image Placeholder 1"/>
+          <p:cNvSpPr>
+            <a:spLocks noGrp="1" noRot="1" noChangeAspect="1"/>
+          </p:cNvSpPr>
+          <p:nvPr>
+            <p:ph type="sldImg"/>
+          </p:nvPr>
+        </p:nvSpPr>
+        <p:spPr/>
+      </p:sp>
+      <p:sp>
+        <p:nvSpPr>
+          <p:cNvPr id="3" name="Notes Placeholder 2"/>
+          <p:cNvSpPr>
+            <a:spLocks noGrp="1"/>
+          </p:cNvSpPr>
+          <p:nvPr>
+            <p:ph type="body" idx="1"/>
+          </p:nvPr>
+        </p:nvSpPr>
+        <p:spPr/>
+        <p:txBody>
+          <a:bodyPr/>
+          <a:lstStyle/>
+          <a:p>
+            <a:r>
+              <a:rPr lang="en-US" dirty="0"/>
+              <a:t>Because</a:t>
+            </a:r>
+            <a:r>
+              <a:rPr lang="en-US" baseline="0" dirty="0"/>
+              <a:t> </a:t>
+            </a:r>
+            <a:r>
+              <a:rPr lang="en-US" baseline="0" dirty="0" err="1"/>
+              <a:t>Git</a:t>
+            </a:r>
+            <a:r>
+              <a:rPr lang="en-US" baseline="0" dirty="0"/>
+              <a:t> is really cool and can be used for a whole bunch of things.</a:t>
+            </a:r>
+            <a:endParaRPr lang="en-US" dirty="0"/>
+          </a:p>
+        </p:txBody>
+      </p:sp>
+      <p:sp>
+        <p:nvSpPr>
+          <p:cNvPr id="4" name="Slide Number Placeholder 3"/>
+          <p:cNvSpPr>
+            <a:spLocks noGrp="1"/>
+          </p:cNvSpPr>
+          <p:nvPr>
+            <p:ph type="sldNum" sz="quarter" idx="10"/>
+          </p:nvPr>
+        </p:nvSpPr>
+        <p:spPr/>
+        <p:txBody>
+          <a:bodyPr/>
+          <a:lstStyle/>
+          <a:p>
+            <a:fld id="{185FB945-B377-4489-BEA0-943980B5D2EB}" type="slidenum">
+              <a:rPr lang="en-US" smtClean="0"/>
+              <a:t>11</a:t>
+            </a:fld>
+            <a:endParaRPr lang="en-US"/>
+          </a:p>
+        </p:txBody>
+      </p:sp>
+    </p:spTree>
+    <p:extLst>
+      <p:ext uri="{BB962C8B-B14F-4D97-AF65-F5344CB8AC3E}">
+        <p14:creationId xmlns:p14="http://schemas.microsoft.com/office/powerpoint/2010/main" val="2470452879"/>
+      </p:ext>
+    </p:extLst>
+  </p:cSld>
+  <p:clrMapOvr>
+    <a:masterClrMapping/>
+  </p:clrMapOvr>
+</p:notes>
+</file>
+
 <file path=ppt/slideLayouts/slideLayout1.xml><?xml version="1.0" encoding="utf-8"?>
 <p:sldLayout xmlns:a="http://schemas.openxmlformats.org/drawingml/2006/main" xmlns:r="http://schemas.openxmlformats.org/officeDocument/2006/relationships" xmlns:p="http://schemas.openxmlformats.org/presentationml/2006/main" type="title" preserve="1">
   <p:cSld name="Title Slide">
@@ -309,7 +1585,7 @@
           <a:p>
             <a:fld id="{4AAD347D-5ACD-4C99-B74B-A9C85AD731AF}" type="datetimeFigureOut">
               <a:rPr lang="en-US" dirty="0"/>
-              <a:t>12/15/2016</a:t>
+              <a:t>12/16/2016</a:t>
             </a:fld>
             <a:endParaRPr lang="en-US" dirty="0"/>
           </a:p>
@@ -579,7 +1855,7 @@
           <a:p>
             <a:fld id="{4509A250-FF31-4206-8172-F9D3106AACB1}" type="datetimeFigureOut">
               <a:rPr lang="en-US" dirty="0"/>
-              <a:t>12/15/2016</a:t>
+              <a:t>12/16/2016</a:t>
             </a:fld>
             <a:endParaRPr lang="en-US" dirty="0"/>
           </a:p>
@@ -768,7 +2044,7 @@
           <a:p>
             <a:fld id="{4509A250-FF31-4206-8172-F9D3106AACB1}" type="datetimeFigureOut">
               <a:rPr lang="en-US" dirty="0"/>
-              <a:t>12/15/2016</a:t>
+              <a:t>12/16/2016</a:t>
             </a:fld>
             <a:endParaRPr lang="en-US" dirty="0"/>
           </a:p>
@@ -1036,7 +2312,7 @@
           <a:p>
             <a:fld id="{4509A250-FF31-4206-8172-F9D3106AACB1}" type="datetimeFigureOut">
               <a:rPr lang="en-US" dirty="0"/>
-              <a:t>12/15/2016</a:t>
+              <a:t>12/16/2016</a:t>
             </a:fld>
             <a:endParaRPr lang="en-US" dirty="0"/>
           </a:p>
@@ -1372,7 +2648,7 @@
           <a:p>
             <a:fld id="{4509A250-FF31-4206-8172-F9D3106AACB1}" type="datetimeFigureOut">
               <a:rPr lang="en-US" dirty="0"/>
-              <a:t>12/15/2016</a:t>
+              <a:t>12/16/2016</a:t>
             </a:fld>
             <a:endParaRPr lang="en-US" dirty="0"/>
           </a:p>
@@ -1990,7 +3266,7 @@
           <a:p>
             <a:fld id="{4509A250-FF31-4206-8172-F9D3106AACB1}" type="datetimeFigureOut">
               <a:rPr lang="en-US" dirty="0"/>
-              <a:t>12/15/2016</a:t>
+              <a:t>12/16/2016</a:t>
             </a:fld>
             <a:endParaRPr lang="en-US" dirty="0"/>
           </a:p>
@@ -2845,7 +4121,7 @@
           <a:p>
             <a:fld id="{4509A250-FF31-4206-8172-F9D3106AACB1}" type="datetimeFigureOut">
               <a:rPr lang="en-US" dirty="0"/>
-              <a:t>12/15/2016</a:t>
+              <a:t>12/16/2016</a:t>
             </a:fld>
             <a:endParaRPr lang="en-US" dirty="0"/>
           </a:p>
@@ -3010,7 +4286,7 @@
           <a:p>
             <a:fld id="{4509A250-FF31-4206-8172-F9D3106AACB1}" type="datetimeFigureOut">
               <a:rPr lang="en-US" dirty="0"/>
-              <a:t>12/15/2016</a:t>
+              <a:t>12/16/2016</a:t>
             </a:fld>
             <a:endParaRPr lang="en-US" dirty="0"/>
           </a:p>
@@ -3185,7 +4461,7 @@
           <a:p>
             <a:fld id="{4509A250-FF31-4206-8172-F9D3106AACB1}" type="datetimeFigureOut">
               <a:rPr lang="en-US" dirty="0"/>
-              <a:t>12/15/2016</a:t>
+              <a:t>12/16/2016</a:t>
             </a:fld>
             <a:endParaRPr lang="en-US" dirty="0"/>
           </a:p>
@@ -3350,7 +4626,7 @@
           <a:p>
             <a:fld id="{4509A250-FF31-4206-8172-F9D3106AACB1}" type="datetimeFigureOut">
               <a:rPr lang="en-US" dirty="0"/>
-              <a:t>12/15/2016</a:t>
+              <a:t>12/16/2016</a:t>
             </a:fld>
             <a:endParaRPr lang="en-US" dirty="0"/>
           </a:p>
@@ -3592,7 +4868,7 @@
           <a:p>
             <a:fld id="{9796027F-7875-4030-9381-8BD8C4F21935}" type="datetimeFigureOut">
               <a:rPr lang="en-US" dirty="0"/>
-              <a:t>12/15/2016</a:t>
+              <a:t>12/16/2016</a:t>
             </a:fld>
             <a:endParaRPr lang="en-US" dirty="0"/>
           </a:p>
@@ -3879,7 +5155,7 @@
           <a:p>
             <a:fld id="{9796027F-7875-4030-9381-8BD8C4F21935}" type="datetimeFigureOut">
               <a:rPr lang="en-US" dirty="0"/>
-              <a:t>12/15/2016</a:t>
+              <a:t>12/16/2016</a:t>
             </a:fld>
             <a:endParaRPr lang="en-US" dirty="0"/>
           </a:p>
@@ -4318,7 +5594,7 @@
           <a:p>
             <a:fld id="{9796027F-7875-4030-9381-8BD8C4F21935}" type="datetimeFigureOut">
               <a:rPr lang="en-US" dirty="0"/>
-              <a:t>12/15/2016</a:t>
+              <a:t>12/16/2016</a:t>
             </a:fld>
             <a:endParaRPr lang="en-US" dirty="0"/>
           </a:p>
@@ -4431,7 +5707,7 @@
           <a:p>
             <a:fld id="{4509A250-FF31-4206-8172-F9D3106AACB1}" type="datetimeFigureOut">
               <a:rPr lang="en-US" dirty="0"/>
-              <a:t>12/15/2016</a:t>
+              <a:t>12/16/2016</a:t>
             </a:fld>
             <a:endParaRPr lang="en-US" dirty="0"/>
           </a:p>
@@ -4521,7 +5797,7 @@
           <a:p>
             <a:fld id="{4509A250-FF31-4206-8172-F9D3106AACB1}" type="datetimeFigureOut">
               <a:rPr lang="en-US" dirty="0"/>
-              <a:t>12/15/2016</a:t>
+              <a:t>12/16/2016</a:t>
             </a:fld>
             <a:endParaRPr lang="en-US" dirty="0"/>
           </a:p>
@@ -4795,7 +6071,7 @@
           <a:p>
             <a:fld id="{4509A250-FF31-4206-8172-F9D3106AACB1}" type="datetimeFigureOut">
               <a:rPr lang="en-US" dirty="0"/>
-              <a:t>12/15/2016</a:t>
+              <a:t>12/16/2016</a:t>
             </a:fld>
             <a:endParaRPr lang="en-US" dirty="0"/>
           </a:p>
@@ -5065,7 +6341,7 @@
           <a:p>
             <a:fld id="{4509A250-FF31-4206-8172-F9D3106AACB1}" type="datetimeFigureOut">
               <a:rPr lang="en-US" dirty="0"/>
-              <a:t>12/15/2016</a:t>
+              <a:t>12/16/2016</a:t>
             </a:fld>
             <a:endParaRPr lang="en-US" dirty="0"/>
           </a:p>
@@ -5489,7 +6765,7 @@
           <a:p>
             <a:fld id="{4AAD347D-5ACD-4C99-B74B-A9C85AD731AF}" type="datetimeFigureOut">
               <a:rPr lang="en-US" dirty="0"/>
-              <a:t>12/15/2016</a:t>
+              <a:t>12/16/2016</a:t>
             </a:fld>
             <a:endParaRPr lang="en-US" dirty="0"/>
           </a:p>
@@ -6296,6 +7572,26 @@
               <a:t>Recipes</a:t>
             </a:r>
           </a:p>
+          <a:p>
+            <a:r>
+              <a:rPr lang="en-US" dirty="0"/>
+              <a:t>Program settings (</a:t>
+            </a:r>
+            <a:r>
+              <a:rPr lang="en-US" dirty="0" err="1"/>
+              <a:t>dotfiles</a:t>
+            </a:r>
+            <a:r>
+              <a:rPr lang="en-US" dirty="0"/>
+              <a:t>)</a:t>
+            </a:r>
+          </a:p>
+          <a:p>
+            <a:r>
+              <a:rPr lang="en-US" dirty="0"/>
+              <a:t>This PowerPoint</a:t>
+            </a:r>
+          </a:p>
         </p:txBody>
       </p:sp>
     </p:spTree>
@@ -6312,6 +7608,130 @@
 </file>
 
 <file path=ppt/slides/slide12.xml><?xml version="1.0" encoding="utf-8"?>
+<p:sld xmlns:a="http://schemas.openxmlformats.org/drawingml/2006/main" xmlns:r="http://schemas.openxmlformats.org/officeDocument/2006/relationships" xmlns:p="http://schemas.openxmlformats.org/presentationml/2006/main">
+  <p:cSld>
+    <p:spTree>
+      <p:nvGrpSpPr>
+        <p:cNvPr id="1" name=""/>
+        <p:cNvGrpSpPr/>
+        <p:nvPr/>
+      </p:nvGrpSpPr>
+      <p:grpSpPr>
+        <a:xfrm>
+          <a:off x="0" y="0"/>
+          <a:ext cx="0" cy="0"/>
+          <a:chOff x="0" y="0"/>
+          <a:chExt cx="0" cy="0"/>
+        </a:xfrm>
+      </p:grpSpPr>
+      <p:sp>
+        <p:nvSpPr>
+          <p:cNvPr id="2" name="Title 1"/>
+          <p:cNvSpPr>
+            <a:spLocks noGrp="1"/>
+          </p:cNvSpPr>
+          <p:nvPr>
+            <p:ph type="title"/>
+          </p:nvPr>
+        </p:nvSpPr>
+        <p:spPr/>
+        <p:txBody>
+          <a:bodyPr/>
+          <a:lstStyle/>
+          <a:p>
+            <a:r>
+              <a:rPr lang="en-US" dirty="0"/>
+              <a:t>Other </a:t>
+            </a:r>
+            <a:r>
+              <a:rPr lang="en-US" dirty="0" err="1"/>
+              <a:t>Git</a:t>
+            </a:r>
+            <a:r>
+              <a:rPr lang="en-US" dirty="0"/>
+              <a:t> Resources</a:t>
+            </a:r>
+          </a:p>
+        </p:txBody>
+      </p:sp>
+      <p:sp>
+        <p:nvSpPr>
+          <p:cNvPr id="3" name="Content Placeholder 2"/>
+          <p:cNvSpPr>
+            <a:spLocks noGrp="1"/>
+          </p:cNvSpPr>
+          <p:nvPr>
+            <p:ph idx="1"/>
+          </p:nvPr>
+        </p:nvSpPr>
+        <p:spPr/>
+        <p:txBody>
+          <a:bodyPr/>
+          <a:lstStyle/>
+          <a:p>
+            <a:r>
+              <a:rPr lang="en-US" dirty="0"/>
+              <a:t>Oh Shit, </a:t>
+            </a:r>
+            <a:r>
+              <a:rPr lang="en-US" dirty="0" err="1"/>
+              <a:t>git</a:t>
+            </a:r>
+            <a:r>
+              <a:rPr lang="en-US" dirty="0"/>
+              <a:t>! </a:t>
+            </a:r>
+            <a:r>
+              <a:rPr lang="en-US" dirty="0">
+                <a:hlinkClick r:id="rId3"/>
+              </a:rPr>
+              <a:t>http://ohshitgit.com</a:t>
+            </a:r>
+            <a:endParaRPr lang="en-US" dirty="0"/>
+          </a:p>
+          <a:p>
+            <a:r>
+              <a:rPr lang="en-US" dirty="0" err="1"/>
+              <a:t>Gitless</a:t>
+            </a:r>
+            <a:r>
+              <a:rPr lang="en-US" dirty="0"/>
+              <a:t> </a:t>
+            </a:r>
+            <a:r>
+              <a:rPr lang="en-US" dirty="0">
+                <a:hlinkClick r:id="rId4"/>
+              </a:rPr>
+              <a:t>http://gitless.com/</a:t>
+            </a:r>
+            <a:endParaRPr lang="en-US" dirty="0"/>
+          </a:p>
+          <a:p>
+            <a:r>
+              <a:rPr lang="en-US" dirty="0" err="1"/>
+              <a:t>Github</a:t>
+            </a:r>
+            <a:endParaRPr lang="en-US" dirty="0"/>
+          </a:p>
+          <a:p>
+            <a:endParaRPr lang="en-US" dirty="0"/>
+          </a:p>
+        </p:txBody>
+      </p:sp>
+    </p:spTree>
+    <p:extLst>
+      <p:ext uri="{BB962C8B-B14F-4D97-AF65-F5344CB8AC3E}">
+        <p14:creationId xmlns:p14="http://schemas.microsoft.com/office/powerpoint/2010/main" val="259725837"/>
+      </p:ext>
+    </p:extLst>
+  </p:cSld>
+  <p:clrMapOvr>
+    <a:masterClrMapping/>
+  </p:clrMapOvr>
+</p:sld>
+</file>
+
+<file path=ppt/slides/slide13.xml><?xml version="1.0" encoding="utf-8"?>
 <p:sld xmlns:a="http://schemas.openxmlformats.org/drawingml/2006/main" xmlns:r="http://schemas.openxmlformats.org/officeDocument/2006/relationships" xmlns:p="http://schemas.openxmlformats.org/presentationml/2006/main">
   <p:cSld>
     <p:spTree>
@@ -7118,7 +8538,7 @@
           <p:nvPr/>
         </p:nvPicPr>
         <p:blipFill>
-          <a:blip r:embed="rId2"/>
+          <a:blip r:embed="rId3"/>
           <a:stretch>
             <a:fillRect/>
           </a:stretch>
@@ -7283,7 +8703,7 @@
           <p:nvPr/>
         </p:nvPicPr>
         <p:blipFill>
-          <a:blip r:embed="rId3">
+          <a:blip r:embed="rId4">
             <a:extLst>
               <a:ext uri="{28A0092B-C50C-407E-A947-70E740481C1C}">
                 <a14:useLocalDpi xmlns:a14="http://schemas.microsoft.com/office/drawing/2010/main" val="0"/>
@@ -7324,7 +8744,7 @@
           <p:nvPr/>
         </p:nvPicPr>
         <p:blipFill>
-          <a:blip r:embed="rId4">
+          <a:blip r:embed="rId5">
             <a:extLst>
               <a:ext uri="{28A0092B-C50C-407E-A947-70E740481C1C}">
                 <a14:useLocalDpi xmlns:a14="http://schemas.microsoft.com/office/drawing/2010/main" val="0"/>
@@ -8392,7 +9812,7 @@
           <p:nvPr/>
         </p:nvPicPr>
         <p:blipFill>
-          <a:blip r:embed="rId2"/>
+          <a:blip r:embed="rId3"/>
           <a:stretch>
             <a:fillRect/>
           </a:stretch>
@@ -9079,7 +10499,7 @@
           <p:nvPr/>
         </p:nvPicPr>
         <p:blipFill rotWithShape="1">
-          <a:blip r:embed="rId2"/>
+          <a:blip r:embed="rId3"/>
           <a:srcRect l="39948" b="8319"/>
           <a:stretch/>
         </p:blipFill>
@@ -9260,7 +10680,7 @@
           <p:nvPr/>
         </p:nvPicPr>
         <p:blipFill>
-          <a:blip r:embed="rId2">
+          <a:blip r:embed="rId3">
             <a:extLst>
               <a:ext uri="{28A0092B-C50C-407E-A947-70E740481C1C}">
                 <a14:useLocalDpi xmlns:a14="http://schemas.microsoft.com/office/drawing/2010/main" val="0"/>
@@ -9301,7 +10721,7 @@
           <p:nvPr/>
         </p:nvPicPr>
         <p:blipFill>
-          <a:blip r:embed="rId3">
+          <a:blip r:embed="rId4">
             <a:extLst>
               <a:ext uri="{28A0092B-C50C-407E-A947-70E740481C1C}">
                 <a14:useLocalDpi xmlns:a14="http://schemas.microsoft.com/office/drawing/2010/main" val="0"/>
@@ -9342,7 +10762,7 @@
           <p:nvPr/>
         </p:nvPicPr>
         <p:blipFill>
-          <a:blip r:embed="rId4">
+          <a:blip r:embed="rId5">
             <a:extLst>
               <a:ext uri="{28A0092B-C50C-407E-A947-70E740481C1C}">
                 <a14:useLocalDpi xmlns:a14="http://schemas.microsoft.com/office/drawing/2010/main" val="0"/>
@@ -9453,7 +10873,7 @@
           <p:nvPr/>
         </p:nvPicPr>
         <p:blipFill>
-          <a:blip r:embed="rId2">
+          <a:blip r:embed="rId3">
             <a:extLst>
               <a:ext uri="{28A0092B-C50C-407E-A947-70E740481C1C}">
                 <a14:useLocalDpi xmlns:a14="http://schemas.microsoft.com/office/drawing/2010/main" val="0"/>
@@ -9684,7 +11104,7 @@
                 <a:latin typeface="Courier New" panose="02070309020205020404" pitchFamily="49" charset="0"/>
                 <a:cs typeface="Courier New" panose="02070309020205020404" pitchFamily="49" charset="0"/>
               </a:rPr>
-              <a:t> clone ssh://{username}@csgateway.clarku.edu/home/{username}/{pathtorepo}</a:t>
+              <a:t> clone ssh://username@csgateway.clarku.edu/home/username/pathtorepo</a:t>
             </a:r>
           </a:p>
           <a:p>
@@ -9978,4 +11398,299 @@
     </a:ext>
   </a:extLst>
 </a:theme>
+</file>
+
+<file path=ppt/theme/theme2.xml><?xml version="1.0" encoding="utf-8"?>
+<a:theme xmlns:a="http://schemas.openxmlformats.org/drawingml/2006/main" name="Office Theme">
+  <a:themeElements>
+    <a:clrScheme name="Office">
+      <a:dk1>
+        <a:sysClr val="windowText" lastClr="000000"/>
+      </a:dk1>
+      <a:lt1>
+        <a:sysClr val="window" lastClr="FFFFFF"/>
+      </a:lt1>
+      <a:dk2>
+        <a:srgbClr val="44546A"/>
+      </a:dk2>
+      <a:lt2>
+        <a:srgbClr val="E7E6E6"/>
+      </a:lt2>
+      <a:accent1>
+        <a:srgbClr val="5B9BD5"/>
+      </a:accent1>
+      <a:accent2>
+        <a:srgbClr val="ED7D31"/>
+      </a:accent2>
+      <a:accent3>
+        <a:srgbClr val="A5A5A5"/>
+      </a:accent3>
+      <a:accent4>
+        <a:srgbClr val="FFC000"/>
+      </a:accent4>
+      <a:accent5>
+        <a:srgbClr val="4472C4"/>
+      </a:accent5>
+      <a:accent6>
+        <a:srgbClr val="70AD47"/>
+      </a:accent6>
+      <a:hlink>
+        <a:srgbClr val="0563C1"/>
+      </a:hlink>
+      <a:folHlink>
+        <a:srgbClr val="954F72"/>
+      </a:folHlink>
+    </a:clrScheme>
+    <a:fontScheme name="Office">
+      <a:majorFont>
+        <a:latin typeface="Calibri Light" panose="020F0302020204030204"/>
+        <a:ea typeface=""/>
+        <a:cs typeface=""/>
+        <a:font script="Jpan" typeface="游ゴシック Light"/>
+        <a:font script="Hang" typeface="맑은 고딕"/>
+        <a:font script="Hans" typeface="等线 Light"/>
+        <a:font script="Hant" typeface="新細明體"/>
+        <a:font script="Arab" typeface="Times New Roman"/>
+        <a:font script="Hebr" typeface="Times New Roman"/>
+        <a:font script="Thai" typeface="Angsana New"/>
+        <a:font script="Ethi" typeface="Nyala"/>
+        <a:font script="Beng" typeface="Vrinda"/>
+        <a:font script="Gujr" typeface="Shruti"/>
+        <a:font script="Khmr" typeface="MoolBoran"/>
+        <a:font script="Knda" typeface="Tunga"/>
+        <a:font script="Guru" typeface="Raavi"/>
+        <a:font script="Cans" typeface="Euphemia"/>
+        <a:font script="Cher" typeface="Plantagenet Cherokee"/>
+        <a:font script="Yiii" typeface="Microsoft Yi Baiti"/>
+        <a:font script="Tibt" typeface="Microsoft Himalaya"/>
+        <a:font script="Thaa" typeface="MV Boli"/>
+        <a:font script="Deva" typeface="Mangal"/>
+        <a:font script="Telu" typeface="Gautami"/>
+        <a:font script="Taml" typeface="Latha"/>
+        <a:font script="Syrc" typeface="Estrangelo Edessa"/>
+        <a:font script="Orya" typeface="Kalinga"/>
+        <a:font script="Mlym" typeface="Kartika"/>
+        <a:font script="Laoo" typeface="DokChampa"/>
+        <a:font script="Sinh" typeface="Iskoola Pota"/>
+        <a:font script="Mong" typeface="Mongolian Baiti"/>
+        <a:font script="Viet" typeface="Times New Roman"/>
+        <a:font script="Uigh" typeface="Microsoft Uighur"/>
+        <a:font script="Geor" typeface="Sylfaen"/>
+        <a:font script="Armn" typeface="Arial"/>
+        <a:font script="Bugi" typeface="Leelawadee UI"/>
+        <a:font script="Bopo" typeface="Microsoft JhengHei"/>
+        <a:font script="Java" typeface="Javanese Text"/>
+        <a:font script="Lisu" typeface="Segoe UI"/>
+        <a:font script="Mymr" typeface="Myanmar Text"/>
+        <a:font script="Nkoo" typeface="Ebrima"/>
+        <a:font script="Olck" typeface="Nirmala UI"/>
+        <a:font script="Osma" typeface="Ebrima"/>
+        <a:font script="Phag" typeface="Phagspa"/>
+        <a:font script="Syrn" typeface="Estrangelo Edessa"/>
+        <a:font script="Syrj" typeface="Estrangelo Edessa"/>
+        <a:font script="Syre" typeface="Estrangelo Edessa"/>
+        <a:font script="Sora" typeface="Nirmala UI"/>
+        <a:font script="Tale" typeface="Microsoft Tai Le"/>
+        <a:font script="Talu" typeface="Microsoft New Tai Lue"/>
+        <a:font script="Tfng" typeface="Ebrima"/>
+      </a:majorFont>
+      <a:minorFont>
+        <a:latin typeface="Calibri" panose="020F0502020204030204"/>
+        <a:ea typeface=""/>
+        <a:cs typeface=""/>
+        <a:font script="Jpan" typeface="游ゴシック"/>
+        <a:font script="Hang" typeface="맑은 고딕"/>
+        <a:font script="Hans" typeface="等线"/>
+        <a:font script="Hant" typeface="新細明體"/>
+        <a:font script="Arab" typeface="Arial"/>
+        <a:font script="Hebr" typeface="Arial"/>
+        <a:font script="Thai" typeface="Cordia New"/>
+        <a:font script="Ethi" typeface="Nyala"/>
+        <a:font script="Beng" typeface="Vrinda"/>
+        <a:font script="Gujr" typeface="Shruti"/>
+        <a:font script="Khmr" typeface="DaunPenh"/>
+        <a:font script="Knda" typeface="Tunga"/>
+        <a:font script="Guru" typeface="Raavi"/>
+        <a:font script="Cans" typeface="Euphemia"/>
+        <a:font script="Cher" typeface="Plantagenet Cherokee"/>
+        <a:font script="Yiii" typeface="Microsoft Yi Baiti"/>
+        <a:font script="Tibt" typeface="Microsoft Himalaya"/>
+        <a:font script="Thaa" typeface="MV Boli"/>
+        <a:font script="Deva" typeface="Mangal"/>
+        <a:font script="Telu" typeface="Gautami"/>
+        <a:font script="Taml" typeface="Latha"/>
+        <a:font script="Syrc" typeface="Estrangelo Edessa"/>
+        <a:font script="Orya" typeface="Kalinga"/>
+        <a:font script="Mlym" typeface="Kartika"/>
+        <a:font script="Laoo" typeface="DokChampa"/>
+        <a:font script="Sinh" typeface="Iskoola Pota"/>
+        <a:font script="Mong" typeface="Mongolian Baiti"/>
+        <a:font script="Viet" typeface="Arial"/>
+        <a:font script="Uigh" typeface="Microsoft Uighur"/>
+        <a:font script="Geor" typeface="Sylfaen"/>
+        <a:font script="Armn" typeface="Arial"/>
+        <a:font script="Bugi" typeface="Leelawadee UI"/>
+        <a:font script="Bopo" typeface="Microsoft JhengHei"/>
+        <a:font script="Java" typeface="Javanese Text"/>
+        <a:font script="Lisu" typeface="Segoe UI"/>
+        <a:font script="Mymr" typeface="Myanmar Text"/>
+        <a:font script="Nkoo" typeface="Ebrima"/>
+        <a:font script="Olck" typeface="Nirmala UI"/>
+        <a:font script="Osma" typeface="Ebrima"/>
+        <a:font script="Phag" typeface="Phagspa"/>
+        <a:font script="Syrn" typeface="Estrangelo Edessa"/>
+        <a:font script="Syrj" typeface="Estrangelo Edessa"/>
+        <a:font script="Syre" typeface="Estrangelo Edessa"/>
+        <a:font script="Sora" typeface="Nirmala UI"/>
+        <a:font script="Tale" typeface="Microsoft Tai Le"/>
+        <a:font script="Talu" typeface="Microsoft New Tai Lue"/>
+        <a:font script="Tfng" typeface="Ebrima"/>
+      </a:minorFont>
+    </a:fontScheme>
+    <a:fmtScheme name="Office">
+      <a:fillStyleLst>
+        <a:solidFill>
+          <a:schemeClr val="phClr"/>
+        </a:solidFill>
+        <a:gradFill rotWithShape="1">
+          <a:gsLst>
+            <a:gs pos="0">
+              <a:schemeClr val="phClr">
+                <a:lumMod val="110000"/>
+                <a:satMod val="105000"/>
+                <a:tint val="67000"/>
+              </a:schemeClr>
+            </a:gs>
+            <a:gs pos="50000">
+              <a:schemeClr val="phClr">
+                <a:lumMod val="105000"/>
+                <a:satMod val="103000"/>
+                <a:tint val="73000"/>
+              </a:schemeClr>
+            </a:gs>
+            <a:gs pos="100000">
+              <a:schemeClr val="phClr">
+                <a:lumMod val="105000"/>
+                <a:satMod val="109000"/>
+                <a:tint val="81000"/>
+              </a:schemeClr>
+            </a:gs>
+          </a:gsLst>
+          <a:lin ang="5400000" scaled="0"/>
+        </a:gradFill>
+        <a:gradFill rotWithShape="1">
+          <a:gsLst>
+            <a:gs pos="0">
+              <a:schemeClr val="phClr">
+                <a:satMod val="103000"/>
+                <a:lumMod val="102000"/>
+                <a:tint val="94000"/>
+              </a:schemeClr>
+            </a:gs>
+            <a:gs pos="50000">
+              <a:schemeClr val="phClr">
+                <a:satMod val="110000"/>
+                <a:lumMod val="100000"/>
+                <a:shade val="100000"/>
+              </a:schemeClr>
+            </a:gs>
+            <a:gs pos="100000">
+              <a:schemeClr val="phClr">
+                <a:lumMod val="99000"/>
+                <a:satMod val="120000"/>
+                <a:shade val="78000"/>
+              </a:schemeClr>
+            </a:gs>
+          </a:gsLst>
+          <a:lin ang="5400000" scaled="0"/>
+        </a:gradFill>
+      </a:fillStyleLst>
+      <a:lnStyleLst>
+        <a:ln w="6350" cap="flat" cmpd="sng" algn="ctr">
+          <a:solidFill>
+            <a:schemeClr val="phClr"/>
+          </a:solidFill>
+          <a:prstDash val="solid"/>
+          <a:miter lim="800000"/>
+        </a:ln>
+        <a:ln w="12700" cap="flat" cmpd="sng" algn="ctr">
+          <a:solidFill>
+            <a:schemeClr val="phClr"/>
+          </a:solidFill>
+          <a:prstDash val="solid"/>
+          <a:miter lim="800000"/>
+        </a:ln>
+        <a:ln w="19050" cap="flat" cmpd="sng" algn="ctr">
+          <a:solidFill>
+            <a:schemeClr val="phClr"/>
+          </a:solidFill>
+          <a:prstDash val="solid"/>
+          <a:miter lim="800000"/>
+        </a:ln>
+      </a:lnStyleLst>
+      <a:effectStyleLst>
+        <a:effectStyle>
+          <a:effectLst/>
+        </a:effectStyle>
+        <a:effectStyle>
+          <a:effectLst/>
+        </a:effectStyle>
+        <a:effectStyle>
+          <a:effectLst>
+            <a:outerShdw blurRad="57150" dist="19050" dir="5400000" algn="ctr" rotWithShape="0">
+              <a:srgbClr val="000000">
+                <a:alpha val="63000"/>
+              </a:srgbClr>
+            </a:outerShdw>
+          </a:effectLst>
+        </a:effectStyle>
+      </a:effectStyleLst>
+      <a:bgFillStyleLst>
+        <a:solidFill>
+          <a:schemeClr val="phClr"/>
+        </a:solidFill>
+        <a:solidFill>
+          <a:schemeClr val="phClr">
+            <a:tint val="95000"/>
+            <a:satMod val="170000"/>
+          </a:schemeClr>
+        </a:solidFill>
+        <a:gradFill rotWithShape="1">
+          <a:gsLst>
+            <a:gs pos="0">
+              <a:schemeClr val="phClr">
+                <a:tint val="93000"/>
+                <a:satMod val="150000"/>
+                <a:shade val="98000"/>
+                <a:lumMod val="102000"/>
+              </a:schemeClr>
+            </a:gs>
+            <a:gs pos="50000">
+              <a:schemeClr val="phClr">
+                <a:tint val="98000"/>
+                <a:satMod val="130000"/>
+                <a:shade val="90000"/>
+                <a:lumMod val="103000"/>
+              </a:schemeClr>
+            </a:gs>
+            <a:gs pos="100000">
+              <a:schemeClr val="phClr">
+                <a:shade val="63000"/>
+                <a:satMod val="120000"/>
+              </a:schemeClr>
+            </a:gs>
+          </a:gsLst>
+          <a:lin ang="5400000" scaled="0"/>
+        </a:gradFill>
+      </a:bgFillStyleLst>
+    </a:fmtScheme>
+  </a:themeElements>
+  <a:objectDefaults/>
+  <a:extraClrSchemeLst/>
+  <a:extLst>
+    <a:ext uri="{05A4C25C-085E-4340-85A3-A5531E510DB2}">
+      <thm15:themeFamily xmlns:thm15="http://schemas.microsoft.com/office/thememl/2012/main" name="Office Theme" id="{62F939B6-93AF-4DB8-9C6B-D6C7DFDC589F}" vid="{4A3C46E8-61CC-4603-A589-7422A47A8E4A}"/>
+    </a:ext>
+  </a:extLst>
+</a:theme>
 </file>
</xml_diff>

<commit_message>
Added picture from Josh
</commit_message>
<xml_diff>
--- a/Git 101.pptx
+++ b/Git 101.pptx
@@ -5,22 +5,23 @@
     <p:sldMasterId id="2147483661" r:id="rId1"/>
   </p:sldMasterIdLst>
   <p:notesMasterIdLst>
-    <p:notesMasterId r:id="rId15"/>
+    <p:notesMasterId r:id="rId16"/>
   </p:notesMasterIdLst>
   <p:sldIdLst>
     <p:sldId id="256" r:id="rId2"/>
-    <p:sldId id="257" r:id="rId3"/>
-    <p:sldId id="258" r:id="rId4"/>
-    <p:sldId id="259" r:id="rId5"/>
-    <p:sldId id="260" r:id="rId6"/>
-    <p:sldId id="261" r:id="rId7"/>
-    <p:sldId id="262" r:id="rId8"/>
-    <p:sldId id="263" r:id="rId9"/>
-    <p:sldId id="264" r:id="rId10"/>
-    <p:sldId id="265" r:id="rId11"/>
-    <p:sldId id="266" r:id="rId12"/>
-    <p:sldId id="267" r:id="rId13"/>
-    <p:sldId id="268" r:id="rId14"/>
+    <p:sldId id="269" r:id="rId3"/>
+    <p:sldId id="257" r:id="rId4"/>
+    <p:sldId id="258" r:id="rId5"/>
+    <p:sldId id="259" r:id="rId6"/>
+    <p:sldId id="260" r:id="rId7"/>
+    <p:sldId id="261" r:id="rId8"/>
+    <p:sldId id="262" r:id="rId9"/>
+    <p:sldId id="263" r:id="rId10"/>
+    <p:sldId id="264" r:id="rId11"/>
+    <p:sldId id="265" r:id="rId12"/>
+    <p:sldId id="266" r:id="rId13"/>
+    <p:sldId id="267" r:id="rId14"/>
+    <p:sldId id="268" r:id="rId15"/>
   </p:sldIdLst>
   <p:sldSz cx="12192000" cy="6858000"/>
   <p:notesSz cx="6858000" cy="9144000"/>
@@ -558,7 +559,7 @@
                 <a:latin typeface="+mn-lt"/>
                 <a:ea typeface="+mn-ea"/>
               </a:rPr>
-              <a:t>3</a:t>
+              <a:t>4</a:t>
             </a:fld>
             <a:endParaRPr lang="en-US" sz="1400" b="0" strike="noStrike" spc="-1">
               <a:solidFill>
@@ -677,7 +678,7 @@
                 <a:latin typeface="+mn-lt"/>
                 <a:ea typeface="+mn-ea"/>
               </a:rPr>
-              <a:t>12</a:t>
+              <a:t>13</a:t>
             </a:fld>
             <a:endParaRPr lang="en-US" sz="1400" b="0" strike="noStrike" spc="-1">
               <a:solidFill>
@@ -799,7 +800,7 @@
                 <a:latin typeface="+mn-lt"/>
                 <a:ea typeface="+mn-ea"/>
               </a:rPr>
-              <a:t>4</a:t>
+              <a:t>5</a:t>
             </a:fld>
             <a:endParaRPr lang="en-US" sz="1400" b="0" strike="noStrike" spc="-1">
               <a:solidFill>
@@ -921,7 +922,7 @@
                 <a:latin typeface="+mn-lt"/>
                 <a:ea typeface="+mn-ea"/>
               </a:rPr>
-              <a:t>5</a:t>
+              <a:t>6</a:t>
             </a:fld>
             <a:endParaRPr lang="en-US" sz="1400" b="0" strike="noStrike" spc="-1">
               <a:solidFill>
@@ -1043,7 +1044,7 @@
                 <a:latin typeface="+mn-lt"/>
                 <a:ea typeface="+mn-ea"/>
               </a:rPr>
-              <a:t>6</a:t>
+              <a:t>7</a:t>
             </a:fld>
             <a:endParaRPr lang="en-US" sz="1400" b="0" strike="noStrike" spc="-1">
               <a:solidFill>
@@ -1165,7 +1166,7 @@
                 <a:latin typeface="+mn-lt"/>
                 <a:ea typeface="+mn-ea"/>
               </a:rPr>
-              <a:t>7</a:t>
+              <a:t>8</a:t>
             </a:fld>
             <a:endParaRPr lang="en-US" sz="1400" b="0" strike="noStrike" spc="-1">
               <a:solidFill>
@@ -1287,7 +1288,7 @@
                 <a:latin typeface="+mn-lt"/>
                 <a:ea typeface="+mn-ea"/>
               </a:rPr>
-              <a:t>8</a:t>
+              <a:t>9</a:t>
             </a:fld>
             <a:endParaRPr lang="en-US" sz="1400" b="0" strike="noStrike" spc="-1">
               <a:solidFill>
@@ -1409,7 +1410,7 @@
                 <a:latin typeface="+mn-lt"/>
                 <a:ea typeface="+mn-ea"/>
               </a:rPr>
-              <a:t>9</a:t>
+              <a:t>10</a:t>
             </a:fld>
             <a:endParaRPr lang="en-US" sz="1400" b="0" strike="noStrike" spc="-1">
               <a:solidFill>
@@ -1531,7 +1532,7 @@
                 <a:latin typeface="+mn-lt"/>
                 <a:ea typeface="+mn-ea"/>
               </a:rPr>
-              <a:t>10</a:t>
+              <a:t>11</a:t>
             </a:fld>
             <a:endParaRPr lang="en-US" sz="1400" b="0" strike="noStrike" spc="-1">
               <a:solidFill>
@@ -1653,7 +1654,7 @@
                 <a:latin typeface="+mn-lt"/>
                 <a:ea typeface="+mn-ea"/>
               </a:rPr>
-              <a:t>11</a:t>
+              <a:t>12</a:t>
             </a:fld>
             <a:endParaRPr lang="en-US" sz="1400" b="0" strike="noStrike" spc="-1">
               <a:solidFill>
@@ -1863,7 +1864,7 @@
           <a:p>
             <a:fld id="{4AAD347D-5ACD-4C99-B74B-A9C85AD731AF}" type="datetimeFigureOut">
               <a:rPr lang="en-US" dirty="0"/>
-              <a:t>2/13/2017</a:t>
+              <a:t>2/15/2017</a:t>
             </a:fld>
             <a:endParaRPr lang="en-US" dirty="0"/>
           </a:p>
@@ -6770,7 +6771,7 @@
           <a:p>
             <a:fld id="{4509A250-FF31-4206-8172-F9D3106AACB1}" type="datetimeFigureOut">
               <a:rPr lang="en-US" dirty="0"/>
-              <a:t>2/13/2017</a:t>
+              <a:t>2/15/2017</a:t>
             </a:fld>
             <a:endParaRPr lang="en-US" dirty="0"/>
           </a:p>
@@ -8855,7 +8856,7 @@
       </p:grpSpPr>
       <p:sp>
         <p:nvSpPr>
-          <p:cNvPr id="134" name="TextShape 1"/>
+          <p:cNvPr id="132" name="TextShape 1"/>
           <p:cNvSpPr txBox="1"/>
           <p:nvPr/>
         </p:nvSpPr>
@@ -8893,7 +8894,7 @@
                 </a:uFill>
                 <a:latin typeface="Century Gothic"/>
               </a:rPr>
-              <a:t>Suggested Setup for Pair Programming</a:t>
+              <a:t>Using with your Clark CS Account</a:t>
             </a:r>
             <a:endParaRPr lang="en-US" sz="1800" b="0" strike="noStrike" spc="-1">
               <a:solidFill>
@@ -8911,7 +8912,7 @@
       </p:sp>
       <p:sp>
         <p:nvSpPr>
-          <p:cNvPr id="135" name="TextShape 2"/>
+          <p:cNvPr id="133" name="TextShape 2"/>
           <p:cNvSpPr txBox="1"/>
           <p:nvPr/>
         </p:nvSpPr>
@@ -8955,7 +8956,7 @@
                 </a:uFill>
                 <a:latin typeface="Century Gothic"/>
               </a:rPr>
-              <a:t>Use BitBucket</a:t>
+              <a:t>Create a repository on system</a:t>
             </a:r>
           </a:p>
           <a:p>
@@ -8982,7 +8983,7 @@
                 </a:uFill>
                 <a:latin typeface="Century Gothic"/>
               </a:rPr>
-              <a:t>Create repository with private access</a:t>
+              <a:t>Commit changes</a:t>
             </a:r>
           </a:p>
           <a:p>
@@ -9009,15 +9010,8 @@
                 </a:uFill>
                 <a:latin typeface="Century Gothic"/>
               </a:rPr>
-              <a:t>Add members to repository</a:t>
-            </a:r>
-          </a:p>
-          <a:p>
-            <a:pPr>
-              <a:lnSpc>
-                <a:spcPct val="100000"/>
-              </a:lnSpc>
-            </a:pPr>
+              <a:t>On local computer, </a:t>
+            </a:r>
             <a:r>
               <a:rPr lang="en-US" sz="2000" b="0" strike="noStrike" spc="-1">
                 <a:solidFill>
@@ -9028,10 +9022,21 @@
                     <a:srgbClr val="FFFFFF"/>
                   </a:solidFill>
                 </a:uFill>
-                <a:latin typeface="Century Gothic"/>
-              </a:rPr>
-              <a:t>OR</a:t>
-            </a:r>
+                <a:latin typeface="Courier New"/>
+              </a:rPr>
+              <a:t>git clone ssh://username@csgateway.clarku.edu/home/username/pathtorepo</a:t>
+            </a:r>
+            <a:endParaRPr lang="en-US" sz="2000" b="0" strike="noStrike" spc="-1">
+              <a:solidFill>
+                <a:srgbClr val="FFFFFF"/>
+              </a:solidFill>
+              <a:uFill>
+                <a:solidFill>
+                  <a:srgbClr val="FFFFFF"/>
+                </a:solidFill>
+              </a:uFill>
+              <a:latin typeface="Century Gothic"/>
+            </a:endParaRPr>
           </a:p>
           <a:p>
             <a:pPr marL="343080" indent="-342720">
@@ -9057,34 +9062,7 @@
                 </a:uFill>
                 <a:latin typeface="Century Gothic"/>
               </a:rPr>
-              <a:t>Create team with partner</a:t>
-            </a:r>
-          </a:p>
-          <a:p>
-            <a:pPr marL="343080" indent="-342720">
-              <a:lnSpc>
-                <a:spcPct val="100000"/>
-              </a:lnSpc>
-              <a:buClr>
-                <a:srgbClr val="8AD0D6"/>
-              </a:buClr>
-              <a:buSzPct val="80000"/>
-              <a:buFont typeface="Wingdings 3" charset="2"/>
-              <a:buChar char=""/>
-            </a:pPr>
-            <a:r>
-              <a:rPr lang="en-US" sz="2000" b="0" strike="noStrike" spc="-1">
-                <a:solidFill>
-                  <a:srgbClr val="FFFFFF"/>
-                </a:solidFill>
-                <a:uFill>
-                  <a:solidFill>
-                    <a:srgbClr val="FFFFFF"/>
-                  </a:solidFill>
-                </a:uFill>
-                <a:latin typeface="Century Gothic"/>
-              </a:rPr>
-              <a:t>Create repository under team</a:t>
+              <a:t>Won’t work with pair programming</a:t>
             </a:r>
           </a:p>
         </p:txBody>
@@ -9143,7 +9121,7 @@
       </p:grpSpPr>
       <p:sp>
         <p:nvSpPr>
-          <p:cNvPr id="136" name="TextShape 1"/>
+          <p:cNvPr id="134" name="TextShape 1"/>
           <p:cNvSpPr txBox="1"/>
           <p:nvPr/>
         </p:nvSpPr>
@@ -9181,7 +9159,7 @@
                 </a:uFill>
                 <a:latin typeface="Century Gothic"/>
               </a:rPr>
-              <a:t>Can I use Git for other things?</a:t>
+              <a:t>Suggested Setup for Pair Programming</a:t>
             </a:r>
             <a:endParaRPr lang="en-US" sz="1800" b="0" strike="noStrike" spc="-1">
               <a:solidFill>
@@ -9199,7 +9177,7 @@
       </p:sp>
       <p:sp>
         <p:nvSpPr>
-          <p:cNvPr id="137" name="TextShape 2"/>
+          <p:cNvPr id="135" name="TextShape 2"/>
           <p:cNvSpPr txBox="1"/>
           <p:nvPr/>
         </p:nvSpPr>
@@ -9243,7 +9221,7 @@
                 </a:uFill>
                 <a:latin typeface="Century Gothic"/>
               </a:rPr>
-              <a:t>Absolutely!</a:t>
+              <a:t>Use BitBucket</a:t>
             </a:r>
           </a:p>
           <a:p>
@@ -9270,7 +9248,7 @@
                 </a:uFill>
                 <a:latin typeface="Century Gothic"/>
               </a:rPr>
-              <a:t>Essays</a:t>
+              <a:t>Create repository with private access</a:t>
             </a:r>
           </a:p>
           <a:p>
@@ -9297,7 +9275,28 @@
                 </a:uFill>
                 <a:latin typeface="Century Gothic"/>
               </a:rPr>
-              <a:t>Cover letters</a:t>
+              <a:t>Add members to repository</a:t>
+            </a:r>
+          </a:p>
+          <a:p>
+            <a:pPr>
+              <a:lnSpc>
+                <a:spcPct val="100000"/>
+              </a:lnSpc>
+            </a:pPr>
+            <a:r>
+              <a:rPr lang="en-US" sz="2000" b="0" strike="noStrike" spc="-1">
+                <a:solidFill>
+                  <a:srgbClr val="FFFFFF"/>
+                </a:solidFill>
+                <a:uFill>
+                  <a:solidFill>
+                    <a:srgbClr val="FFFFFF"/>
+                  </a:solidFill>
+                </a:uFill>
+                <a:latin typeface="Century Gothic"/>
+              </a:rPr>
+              <a:t>OR</a:t>
             </a:r>
           </a:p>
           <a:p>
@@ -9324,7 +9323,7 @@
                 </a:uFill>
                 <a:latin typeface="Century Gothic"/>
               </a:rPr>
-              <a:t>Image editing</a:t>
+              <a:t>Create team with partner</a:t>
             </a:r>
           </a:p>
           <a:p>
@@ -9351,61 +9350,7 @@
                 </a:uFill>
                 <a:latin typeface="Century Gothic"/>
               </a:rPr>
-              <a:t>Recipes</a:t>
-            </a:r>
-          </a:p>
-          <a:p>
-            <a:pPr marL="343080" indent="-342720">
-              <a:lnSpc>
-                <a:spcPct val="100000"/>
-              </a:lnSpc>
-              <a:buClr>
-                <a:srgbClr val="8AD0D6"/>
-              </a:buClr>
-              <a:buSzPct val="80000"/>
-              <a:buFont typeface="Wingdings 3" charset="2"/>
-              <a:buChar char=""/>
-            </a:pPr>
-            <a:r>
-              <a:rPr lang="en-US" sz="2000" b="0" strike="noStrike" spc="-1">
-                <a:solidFill>
-                  <a:srgbClr val="FFFFFF"/>
-                </a:solidFill>
-                <a:uFill>
-                  <a:solidFill>
-                    <a:srgbClr val="FFFFFF"/>
-                  </a:solidFill>
-                </a:uFill>
-                <a:latin typeface="Century Gothic"/>
-              </a:rPr>
-              <a:t>Program settings (dotfiles)</a:t>
-            </a:r>
-          </a:p>
-          <a:p>
-            <a:pPr marL="343080" indent="-342720">
-              <a:lnSpc>
-                <a:spcPct val="100000"/>
-              </a:lnSpc>
-              <a:buClr>
-                <a:srgbClr val="8AD0D6"/>
-              </a:buClr>
-              <a:buSzPct val="80000"/>
-              <a:buFont typeface="Wingdings 3" charset="2"/>
-              <a:buChar char=""/>
-            </a:pPr>
-            <a:r>
-              <a:rPr lang="en-US" sz="2000" b="0" strike="noStrike" spc="-1">
-                <a:solidFill>
-                  <a:srgbClr val="FFFFFF"/>
-                </a:solidFill>
-                <a:uFill>
-                  <a:solidFill>
-                    <a:srgbClr val="FFFFFF"/>
-                  </a:solidFill>
-                </a:uFill>
-                <a:latin typeface="Century Gothic"/>
-              </a:rPr>
-              <a:t>This PowerPoint</a:t>
+              <a:t>Create repository under team</a:t>
             </a:r>
           </a:p>
         </p:txBody>
@@ -9464,7 +9409,7 @@
       </p:grpSpPr>
       <p:sp>
         <p:nvSpPr>
-          <p:cNvPr id="138" name="TextShape 1"/>
+          <p:cNvPr id="136" name="TextShape 1"/>
           <p:cNvSpPr txBox="1"/>
           <p:nvPr/>
         </p:nvSpPr>
@@ -9502,7 +9447,7 @@
                 </a:uFill>
                 <a:latin typeface="Century Gothic"/>
               </a:rPr>
-              <a:t>Other Git Resources</a:t>
+              <a:t>Can I use Git for other things?</a:t>
             </a:r>
             <a:endParaRPr lang="en-US" sz="1800" b="0" strike="noStrike" spc="-1">
               <a:solidFill>
@@ -9520,7 +9465,7 @@
       </p:sp>
       <p:sp>
         <p:nvSpPr>
-          <p:cNvPr id="139" name="TextShape 2"/>
+          <p:cNvPr id="137" name="TextShape 2"/>
           <p:cNvSpPr txBox="1"/>
           <p:nvPr/>
         </p:nvSpPr>
@@ -9553,7 +9498,7 @@
               <a:buChar char=""/>
             </a:pPr>
             <a:r>
-              <a:rPr lang="en-US" sz="2000" b="0" strike="noStrike" spc="-1" dirty="0">
+              <a:rPr lang="en-US" sz="2000" b="0" strike="noStrike" spc="-1">
                 <a:solidFill>
                   <a:srgbClr val="FFFFFF"/>
                 </a:solidFill>
@@ -9564,62 +9509,8 @@
                 </a:uFill>
                 <a:latin typeface="Century Gothic"/>
               </a:rPr>
-              <a:t>Oh Shit, </a:t>
-            </a:r>
-            <a:r>
-              <a:rPr lang="en-US" sz="2000" b="0" strike="noStrike" spc="-1" dirty="0" err="1">
-                <a:solidFill>
-                  <a:srgbClr val="FFFFFF"/>
-                </a:solidFill>
-                <a:uFill>
-                  <a:solidFill>
-                    <a:srgbClr val="FFFFFF"/>
-                  </a:solidFill>
-                </a:uFill>
-                <a:latin typeface="Century Gothic"/>
-              </a:rPr>
-              <a:t>git</a:t>
-            </a:r>
-            <a:r>
-              <a:rPr lang="en-US" sz="2000" b="0" strike="noStrike" spc="-1" dirty="0">
-                <a:solidFill>
-                  <a:srgbClr val="FFFFFF"/>
-                </a:solidFill>
-                <a:uFill>
-                  <a:solidFill>
-                    <a:srgbClr val="FFFFFF"/>
-                  </a:solidFill>
-                </a:uFill>
-                <a:latin typeface="Century Gothic"/>
-              </a:rPr>
-              <a:t>! </a:t>
-            </a:r>
-            <a:r>
-              <a:rPr lang="en-US" sz="2000" b="0" u="sng" strike="noStrike" spc="-1" dirty="0">
-                <a:solidFill>
-                  <a:srgbClr val="58C1BA"/>
-                </a:solidFill>
-                <a:uFill>
-                  <a:solidFill>
-                    <a:srgbClr val="FFFFFF"/>
-                  </a:solidFill>
-                </a:uFill>
-                <a:latin typeface="Century Gothic"/>
-                <a:hlinkClick r:id="rId3"/>
-              </a:rPr>
-              <a:t>http://ohshitgit.com</a:t>
-            </a:r>
-            <a:endParaRPr lang="en-US" sz="2000" b="0" strike="noStrike" spc="-1" dirty="0">
-              <a:solidFill>
-                <a:srgbClr val="FFFFFF"/>
-              </a:solidFill>
-              <a:uFill>
-                <a:solidFill>
-                  <a:srgbClr val="FFFFFF"/>
-                </a:solidFill>
-              </a:uFill>
-              <a:latin typeface="Century Gothic"/>
-            </a:endParaRPr>
+              <a:t>Absolutely!</a:t>
+            </a:r>
           </a:p>
           <a:p>
             <a:pPr marL="343080" indent="-342720">
@@ -9634,7 +9525,7 @@
               <a:buChar char=""/>
             </a:pPr>
             <a:r>
-              <a:rPr lang="en-US" sz="2000" b="0" strike="noStrike" spc="-1" dirty="0" err="1">
+              <a:rPr lang="en-US" sz="2000" b="0" strike="noStrike" spc="-1">
                 <a:solidFill>
                   <a:srgbClr val="FFFFFF"/>
                 </a:solidFill>
@@ -9645,48 +9536,8 @@
                 </a:uFill>
                 <a:latin typeface="Century Gothic"/>
               </a:rPr>
-              <a:t>Gitless</a:t>
-            </a:r>
-            <a:r>
-              <a:rPr lang="en-US" sz="2000" b="0" strike="noStrike" spc="-1" dirty="0">
-                <a:solidFill>
-                  <a:srgbClr val="FFFFFF"/>
-                </a:solidFill>
-                <a:uFill>
-                  <a:solidFill>
-                    <a:srgbClr val="FFFFFF"/>
-                  </a:solidFill>
-                </a:uFill>
-                <a:latin typeface="Century Gothic"/>
-              </a:rPr>
-              <a:t> </a:t>
-            </a:r>
-            <a:r>
-              <a:rPr lang="en-US" sz="2000" b="0" u="sng" strike="noStrike" spc="-1" dirty="0">
-                <a:solidFill>
-                  <a:srgbClr val="58C1BA"/>
-                </a:solidFill>
-                <a:uFill>
-                  <a:solidFill>
-                    <a:srgbClr val="FFFFFF"/>
-                  </a:solidFill>
-                </a:uFill>
-                <a:latin typeface="Century Gothic"/>
-                <a:hlinkClick r:id="rId4"/>
-              </a:rPr>
-              <a:t>http://gitless.com/</a:t>
-            </a:r>
-            <a:endParaRPr lang="en-US" sz="2000" b="0" strike="noStrike" spc="-1" dirty="0">
-              <a:solidFill>
-                <a:srgbClr val="FFFFFF"/>
-              </a:solidFill>
-              <a:uFill>
-                <a:solidFill>
-                  <a:srgbClr val="FFFFFF"/>
-                </a:solidFill>
-              </a:uFill>
-              <a:latin typeface="Century Gothic"/>
-            </a:endParaRPr>
+              <a:t>Essays</a:t>
+            </a:r>
           </a:p>
           <a:p>
             <a:pPr marL="343080" indent="-342720">
@@ -9701,7 +9552,7 @@
               <a:buChar char=""/>
             </a:pPr>
             <a:r>
-              <a:rPr lang="en-US" sz="2000" b="0" strike="noStrike" spc="-1" dirty="0" err="1">
+              <a:rPr lang="en-US" sz="2000" b="0" strike="noStrike" spc="-1">
                 <a:solidFill>
                   <a:srgbClr val="FFFFFF"/>
                 </a:solidFill>
@@ -9712,37 +9563,116 @@
                 </a:uFill>
                 <a:latin typeface="Century Gothic"/>
               </a:rPr>
-              <a:t>Github</a:t>
-            </a:r>
-            <a:endParaRPr lang="en-US" sz="2000" b="0" strike="noStrike" spc="-1" dirty="0">
-              <a:solidFill>
-                <a:srgbClr val="FFFFFF"/>
-              </a:solidFill>
-              <a:uFill>
-                <a:solidFill>
-                  <a:srgbClr val="FFFFFF"/>
-                </a:solidFill>
-              </a:uFill>
-              <a:latin typeface="Century Gothic"/>
-            </a:endParaRPr>
-          </a:p>
-          <a:p>
-            <a:pPr>
+              <a:t>Cover letters</a:t>
+            </a:r>
+          </a:p>
+          <a:p>
+            <a:pPr marL="343080" indent="-342720">
               <a:lnSpc>
                 <a:spcPct val="100000"/>
               </a:lnSpc>
+              <a:buClr>
+                <a:srgbClr val="8AD0D6"/>
+              </a:buClr>
+              <a:buSzPct val="80000"/>
+              <a:buFont typeface="Wingdings 3" charset="2"/>
+              <a:buChar char=""/>
             </a:pPr>
-            <a:endParaRPr lang="en-US" sz="2000" b="0" strike="noStrike" spc="-1" dirty="0">
-              <a:solidFill>
-                <a:srgbClr val="FFFFFF"/>
-              </a:solidFill>
-              <a:uFill>
-                <a:solidFill>
-                  <a:srgbClr val="FFFFFF"/>
-                </a:solidFill>
-              </a:uFill>
-              <a:latin typeface="Century Gothic"/>
-            </a:endParaRPr>
+            <a:r>
+              <a:rPr lang="en-US" sz="2000" b="0" strike="noStrike" spc="-1">
+                <a:solidFill>
+                  <a:srgbClr val="FFFFFF"/>
+                </a:solidFill>
+                <a:uFill>
+                  <a:solidFill>
+                    <a:srgbClr val="FFFFFF"/>
+                  </a:solidFill>
+                </a:uFill>
+                <a:latin typeface="Century Gothic"/>
+              </a:rPr>
+              <a:t>Image editing</a:t>
+            </a:r>
+          </a:p>
+          <a:p>
+            <a:pPr marL="343080" indent="-342720">
+              <a:lnSpc>
+                <a:spcPct val="100000"/>
+              </a:lnSpc>
+              <a:buClr>
+                <a:srgbClr val="8AD0D6"/>
+              </a:buClr>
+              <a:buSzPct val="80000"/>
+              <a:buFont typeface="Wingdings 3" charset="2"/>
+              <a:buChar char=""/>
+            </a:pPr>
+            <a:r>
+              <a:rPr lang="en-US" sz="2000" b="0" strike="noStrike" spc="-1">
+                <a:solidFill>
+                  <a:srgbClr val="FFFFFF"/>
+                </a:solidFill>
+                <a:uFill>
+                  <a:solidFill>
+                    <a:srgbClr val="FFFFFF"/>
+                  </a:solidFill>
+                </a:uFill>
+                <a:latin typeface="Century Gothic"/>
+              </a:rPr>
+              <a:t>Recipes</a:t>
+            </a:r>
+          </a:p>
+          <a:p>
+            <a:pPr marL="343080" indent="-342720">
+              <a:lnSpc>
+                <a:spcPct val="100000"/>
+              </a:lnSpc>
+              <a:buClr>
+                <a:srgbClr val="8AD0D6"/>
+              </a:buClr>
+              <a:buSzPct val="80000"/>
+              <a:buFont typeface="Wingdings 3" charset="2"/>
+              <a:buChar char=""/>
+            </a:pPr>
+            <a:r>
+              <a:rPr lang="en-US" sz="2000" b="0" strike="noStrike" spc="-1">
+                <a:solidFill>
+                  <a:srgbClr val="FFFFFF"/>
+                </a:solidFill>
+                <a:uFill>
+                  <a:solidFill>
+                    <a:srgbClr val="FFFFFF"/>
+                  </a:solidFill>
+                </a:uFill>
+                <a:latin typeface="Century Gothic"/>
+              </a:rPr>
+              <a:t>Program settings (dotfiles)</a:t>
+            </a:r>
+          </a:p>
+          <a:p>
+            <a:pPr marL="343080" indent="-342720">
+              <a:lnSpc>
+                <a:spcPct val="100000"/>
+              </a:lnSpc>
+              <a:buClr>
+                <a:srgbClr val="8AD0D6"/>
+              </a:buClr>
+              <a:buSzPct val="80000"/>
+              <a:buFont typeface="Wingdings 3" charset="2"/>
+              <a:buChar char=""/>
+            </a:pPr>
+            <a:r>
+              <a:rPr lang="en-US" sz="2000" b="0" strike="noStrike" spc="-1">
+                <a:solidFill>
+                  <a:srgbClr val="FFFFFF"/>
+                </a:solidFill>
+                <a:uFill>
+                  <a:solidFill>
+                    <a:srgbClr val="FFFFFF"/>
+                  </a:solidFill>
+                </a:uFill>
+                <a:latin typeface="Century Gothic"/>
+              </a:rPr>
+              <a:t>This PowerPoint</a:t>
+            </a:r>
           </a:p>
         </p:txBody>
       </p:sp>
@@ -9800,6 +9730,342 @@
       </p:grpSpPr>
       <p:sp>
         <p:nvSpPr>
+          <p:cNvPr id="138" name="TextShape 1"/>
+          <p:cNvSpPr txBox="1"/>
+          <p:nvPr/>
+        </p:nvSpPr>
+        <p:spPr>
+          <a:xfrm>
+            <a:off x="646200" y="452880"/>
+            <a:ext cx="9404280" cy="1400040"/>
+          </a:xfrm>
+          <a:prstGeom prst="rect">
+            <a:avLst/>
+          </a:prstGeom>
+          <a:noFill/>
+          <a:ln>
+            <a:noFill/>
+          </a:ln>
+        </p:spPr>
+        <p:txBody>
+          <a:bodyPr/>
+          <a:lstStyle/>
+          <a:p>
+            <a:pPr>
+              <a:lnSpc>
+                <a:spcPct val="100000"/>
+              </a:lnSpc>
+            </a:pPr>
+            <a:r>
+              <a:rPr lang="en-US" sz="4200" b="0" strike="noStrike" spc="-1">
+                <a:solidFill>
+                  <a:srgbClr val="EBEBEB"/>
+                </a:solidFill>
+                <a:uFill>
+                  <a:solidFill>
+                    <a:srgbClr val="FFFFFF"/>
+                  </a:solidFill>
+                </a:uFill>
+                <a:latin typeface="Century Gothic"/>
+              </a:rPr>
+              <a:t>Other Git Resources</a:t>
+            </a:r>
+            <a:endParaRPr lang="en-US" sz="1800" b="0" strike="noStrike" spc="-1">
+              <a:solidFill>
+                <a:srgbClr val="FFFFFF"/>
+              </a:solidFill>
+              <a:uFill>
+                <a:solidFill>
+                  <a:srgbClr val="FFFFFF"/>
+                </a:solidFill>
+              </a:uFill>
+              <a:latin typeface="Century Gothic"/>
+            </a:endParaRPr>
+          </a:p>
+        </p:txBody>
+      </p:sp>
+      <p:sp>
+        <p:nvSpPr>
+          <p:cNvPr id="139" name="TextShape 2"/>
+          <p:cNvSpPr txBox="1"/>
+          <p:nvPr/>
+        </p:nvSpPr>
+        <p:spPr>
+          <a:xfrm>
+            <a:off x="1103400" y="2053080"/>
+            <a:ext cx="8946360" cy="4195080"/>
+          </a:xfrm>
+          <a:prstGeom prst="rect">
+            <a:avLst/>
+          </a:prstGeom>
+          <a:noFill/>
+          <a:ln>
+            <a:noFill/>
+          </a:ln>
+        </p:spPr>
+        <p:txBody>
+          <a:bodyPr/>
+          <a:lstStyle/>
+          <a:p>
+            <a:pPr marL="343080" indent="-342720">
+              <a:lnSpc>
+                <a:spcPct val="100000"/>
+              </a:lnSpc>
+              <a:buClr>
+                <a:srgbClr val="8AD0D6"/>
+              </a:buClr>
+              <a:buSzPct val="80000"/>
+              <a:buFont typeface="Wingdings 3" charset="2"/>
+              <a:buChar char=""/>
+            </a:pPr>
+            <a:r>
+              <a:rPr lang="en-US" sz="2000" b="0" strike="noStrike" spc="-1" dirty="0">
+                <a:solidFill>
+                  <a:srgbClr val="FFFFFF"/>
+                </a:solidFill>
+                <a:uFill>
+                  <a:solidFill>
+                    <a:srgbClr val="FFFFFF"/>
+                  </a:solidFill>
+                </a:uFill>
+                <a:latin typeface="Century Gothic"/>
+              </a:rPr>
+              <a:t>Oh Shit, </a:t>
+            </a:r>
+            <a:r>
+              <a:rPr lang="en-US" sz="2000" b="0" strike="noStrike" spc="-1" dirty="0" err="1">
+                <a:solidFill>
+                  <a:srgbClr val="FFFFFF"/>
+                </a:solidFill>
+                <a:uFill>
+                  <a:solidFill>
+                    <a:srgbClr val="FFFFFF"/>
+                  </a:solidFill>
+                </a:uFill>
+                <a:latin typeface="Century Gothic"/>
+              </a:rPr>
+              <a:t>git</a:t>
+            </a:r>
+            <a:r>
+              <a:rPr lang="en-US" sz="2000" b="0" strike="noStrike" spc="-1" dirty="0">
+                <a:solidFill>
+                  <a:srgbClr val="FFFFFF"/>
+                </a:solidFill>
+                <a:uFill>
+                  <a:solidFill>
+                    <a:srgbClr val="FFFFFF"/>
+                  </a:solidFill>
+                </a:uFill>
+                <a:latin typeface="Century Gothic"/>
+              </a:rPr>
+              <a:t>! </a:t>
+            </a:r>
+            <a:r>
+              <a:rPr lang="en-US" sz="2000" b="0" u="sng" strike="noStrike" spc="-1" dirty="0">
+                <a:solidFill>
+                  <a:srgbClr val="58C1BA"/>
+                </a:solidFill>
+                <a:uFill>
+                  <a:solidFill>
+                    <a:srgbClr val="FFFFFF"/>
+                  </a:solidFill>
+                </a:uFill>
+                <a:latin typeface="Century Gothic"/>
+                <a:hlinkClick r:id="rId3"/>
+              </a:rPr>
+              <a:t>http://ohshitgit.com</a:t>
+            </a:r>
+            <a:endParaRPr lang="en-US" sz="2000" b="0" strike="noStrike" spc="-1" dirty="0">
+              <a:solidFill>
+                <a:srgbClr val="FFFFFF"/>
+              </a:solidFill>
+              <a:uFill>
+                <a:solidFill>
+                  <a:srgbClr val="FFFFFF"/>
+                </a:solidFill>
+              </a:uFill>
+              <a:latin typeface="Century Gothic"/>
+            </a:endParaRPr>
+          </a:p>
+          <a:p>
+            <a:pPr marL="343080" indent="-342720">
+              <a:lnSpc>
+                <a:spcPct val="100000"/>
+              </a:lnSpc>
+              <a:buClr>
+                <a:srgbClr val="8AD0D6"/>
+              </a:buClr>
+              <a:buSzPct val="80000"/>
+              <a:buFont typeface="Wingdings 3" charset="2"/>
+              <a:buChar char=""/>
+            </a:pPr>
+            <a:r>
+              <a:rPr lang="en-US" sz="2000" b="0" strike="noStrike" spc="-1" dirty="0" err="1">
+                <a:solidFill>
+                  <a:srgbClr val="FFFFFF"/>
+                </a:solidFill>
+                <a:uFill>
+                  <a:solidFill>
+                    <a:srgbClr val="FFFFFF"/>
+                  </a:solidFill>
+                </a:uFill>
+                <a:latin typeface="Century Gothic"/>
+              </a:rPr>
+              <a:t>Gitless</a:t>
+            </a:r>
+            <a:r>
+              <a:rPr lang="en-US" sz="2000" b="0" strike="noStrike" spc="-1" dirty="0">
+                <a:solidFill>
+                  <a:srgbClr val="FFFFFF"/>
+                </a:solidFill>
+                <a:uFill>
+                  <a:solidFill>
+                    <a:srgbClr val="FFFFFF"/>
+                  </a:solidFill>
+                </a:uFill>
+                <a:latin typeface="Century Gothic"/>
+              </a:rPr>
+              <a:t> </a:t>
+            </a:r>
+            <a:r>
+              <a:rPr lang="en-US" sz="2000" b="0" u="sng" strike="noStrike" spc="-1" dirty="0">
+                <a:solidFill>
+                  <a:srgbClr val="58C1BA"/>
+                </a:solidFill>
+                <a:uFill>
+                  <a:solidFill>
+                    <a:srgbClr val="FFFFFF"/>
+                  </a:solidFill>
+                </a:uFill>
+                <a:latin typeface="Century Gothic"/>
+                <a:hlinkClick r:id="rId4"/>
+              </a:rPr>
+              <a:t>http://gitless.com/</a:t>
+            </a:r>
+            <a:endParaRPr lang="en-US" sz="2000" b="0" strike="noStrike" spc="-1" dirty="0">
+              <a:solidFill>
+                <a:srgbClr val="FFFFFF"/>
+              </a:solidFill>
+              <a:uFill>
+                <a:solidFill>
+                  <a:srgbClr val="FFFFFF"/>
+                </a:solidFill>
+              </a:uFill>
+              <a:latin typeface="Century Gothic"/>
+            </a:endParaRPr>
+          </a:p>
+          <a:p>
+            <a:pPr marL="343080" indent="-342720">
+              <a:lnSpc>
+                <a:spcPct val="100000"/>
+              </a:lnSpc>
+              <a:buClr>
+                <a:srgbClr val="8AD0D6"/>
+              </a:buClr>
+              <a:buSzPct val="80000"/>
+              <a:buFont typeface="Wingdings 3" charset="2"/>
+              <a:buChar char=""/>
+            </a:pPr>
+            <a:r>
+              <a:rPr lang="en-US" sz="2000" b="0" strike="noStrike" spc="-1" dirty="0" err="1">
+                <a:solidFill>
+                  <a:srgbClr val="FFFFFF"/>
+                </a:solidFill>
+                <a:uFill>
+                  <a:solidFill>
+                    <a:srgbClr val="FFFFFF"/>
+                  </a:solidFill>
+                </a:uFill>
+                <a:latin typeface="Century Gothic"/>
+              </a:rPr>
+              <a:t>Github</a:t>
+            </a:r>
+            <a:endParaRPr lang="en-US" sz="2000" b="0" strike="noStrike" spc="-1" dirty="0">
+              <a:solidFill>
+                <a:srgbClr val="FFFFFF"/>
+              </a:solidFill>
+              <a:uFill>
+                <a:solidFill>
+                  <a:srgbClr val="FFFFFF"/>
+                </a:solidFill>
+              </a:uFill>
+              <a:latin typeface="Century Gothic"/>
+            </a:endParaRPr>
+          </a:p>
+          <a:p>
+            <a:pPr>
+              <a:lnSpc>
+                <a:spcPct val="100000"/>
+              </a:lnSpc>
+            </a:pPr>
+            <a:endParaRPr lang="en-US" sz="2000" b="0" strike="noStrike" spc="-1" dirty="0">
+              <a:solidFill>
+                <a:srgbClr val="FFFFFF"/>
+              </a:solidFill>
+              <a:uFill>
+                <a:solidFill>
+                  <a:srgbClr val="FFFFFF"/>
+                </a:solidFill>
+              </a:uFill>
+              <a:latin typeface="Century Gothic"/>
+            </a:endParaRPr>
+          </a:p>
+        </p:txBody>
+      </p:sp>
+    </p:spTree>
+  </p:cSld>
+  <p:clrMapOvr>
+    <a:masterClrMapping/>
+  </p:clrMapOvr>
+  <p:timing>
+    <p:tnLst>
+      <p:par>
+        <p:cTn id="1" dur="indefinite" restart="never" nodeType="tmRoot">
+          <p:childTnLst>
+            <p:seq>
+              <p:cTn id="2" nodeType="mainSeq"/>
+              <p:prevCondLst>
+                <p:cond evt="onPrev" delay="0">
+                  <p:tgtEl>
+                    <p:sldTgt/>
+                  </p:tgtEl>
+                </p:cond>
+              </p:prevCondLst>
+              <p:nextCondLst>
+                <p:cond evt="onNext" delay="0">
+                  <p:tgtEl>
+                    <p:sldTgt/>
+                  </p:tgtEl>
+                </p:cond>
+              </p:nextCondLst>
+            </p:seq>
+          </p:childTnLst>
+        </p:cTn>
+      </p:par>
+    </p:tnLst>
+  </p:timing>
+</p:sld>
+</file>
+
+<file path=ppt/slides/slide14.xml><?xml version="1.0" encoding="utf-8"?>
+<p:sld xmlns:a="http://schemas.openxmlformats.org/drawingml/2006/main" xmlns:r="http://schemas.openxmlformats.org/officeDocument/2006/relationships" xmlns:p="http://schemas.openxmlformats.org/presentationml/2006/main">
+  <p:cSld>
+    <p:spTree>
+      <p:nvGrpSpPr>
+        <p:cNvPr id="1" name=""/>
+        <p:cNvGrpSpPr/>
+        <p:nvPr/>
+      </p:nvGrpSpPr>
+      <p:grpSpPr>
+        <a:xfrm>
+          <a:off x="0" y="0"/>
+          <a:ext cx="0" cy="0"/>
+          <a:chOff x="0" y="0"/>
+          <a:chExt cx="0" cy="0"/>
+        </a:xfrm>
+      </p:grpSpPr>
+      <p:sp>
+        <p:nvSpPr>
           <p:cNvPr id="140" name="TextShape 1"/>
           <p:cNvSpPr txBox="1"/>
           <p:nvPr/>
@@ -9906,6 +10172,62 @@
           <a:chExt cx="0" cy="0"/>
         </a:xfrm>
       </p:grpSpPr>
+      <p:pic>
+        <p:nvPicPr>
+          <p:cNvPr id="4" name="Content Placeholder 3"/>
+          <p:cNvPicPr>
+            <a:picLocks noGrp="1" noChangeAspect="1"/>
+          </p:cNvPicPr>
+          <p:nvPr>
+            <p:ph idx="1"/>
+          </p:nvPr>
+        </p:nvPicPr>
+        <p:blipFill>
+          <a:blip r:embed="rId2"/>
+          <a:stretch>
+            <a:fillRect/>
+          </a:stretch>
+        </p:blipFill>
+        <p:spPr>
+          <a:xfrm>
+            <a:off x="2382981" y="886691"/>
+            <a:ext cx="7260406" cy="4792462"/>
+          </a:xfrm>
+          <a:prstGeom prst="rect">
+            <a:avLst/>
+          </a:prstGeom>
+        </p:spPr>
+      </p:pic>
+    </p:spTree>
+    <p:extLst>
+      <p:ext uri="{BB962C8B-B14F-4D97-AF65-F5344CB8AC3E}">
+        <p14:creationId xmlns:p14="http://schemas.microsoft.com/office/powerpoint/2010/main" val="1492818824"/>
+      </p:ext>
+    </p:extLst>
+  </p:cSld>
+  <p:clrMapOvr>
+    <a:masterClrMapping/>
+  </p:clrMapOvr>
+</p:sld>
+</file>
+
+<file path=ppt/slides/slide3.xml><?xml version="1.0" encoding="utf-8"?>
+<p:sld xmlns:a="http://schemas.openxmlformats.org/drawingml/2006/main" xmlns:r="http://schemas.openxmlformats.org/officeDocument/2006/relationships" xmlns:p="http://schemas.openxmlformats.org/presentationml/2006/main">
+  <p:cSld>
+    <p:spTree>
+      <p:nvGrpSpPr>
+        <p:cNvPr id="1" name=""/>
+        <p:cNvGrpSpPr/>
+        <p:nvPr/>
+      </p:nvGrpSpPr>
+      <p:grpSpPr>
+        <a:xfrm>
+          <a:off x="0" y="0"/>
+          <a:ext cx="0" cy="0"/>
+          <a:chOff x="0" y="0"/>
+          <a:chExt cx="0" cy="0"/>
+        </a:xfrm>
+      </p:grpSpPr>
       <p:sp>
         <p:nvSpPr>
           <p:cNvPr id="97" name="TextShape 1"/>
@@ -10316,7 +10638,7 @@
 </p:sld>
 </file>
 
-<file path=ppt/slides/slide3.xml><?xml version="1.0" encoding="utf-8"?>
+<file path=ppt/slides/slide4.xml><?xml version="1.0" encoding="utf-8"?>
 <p:sld xmlns:a="http://schemas.openxmlformats.org/drawingml/2006/main" xmlns:r="http://schemas.openxmlformats.org/officeDocument/2006/relationships" xmlns:p="http://schemas.openxmlformats.org/presentationml/2006/main">
   <p:cSld>
     <p:spTree>
@@ -11123,7 +11445,7 @@
 </p:sld>
 </file>
 
-<file path=ppt/slides/slide4.xml><?xml version="1.0" encoding="utf-8"?>
+<file path=ppt/slides/slide5.xml><?xml version="1.0" encoding="utf-8"?>
 <p:sld xmlns:a="http://schemas.openxmlformats.org/drawingml/2006/main" xmlns:r="http://schemas.openxmlformats.org/officeDocument/2006/relationships" xmlns:p="http://schemas.openxmlformats.org/presentationml/2006/main">
   <p:cSld>
     <p:spTree>
@@ -12316,7 +12638,7 @@
 </p:sld>
 </file>
 
-<file path=ppt/slides/slide5.xml><?xml version="1.0" encoding="utf-8"?>
+<file path=ppt/slides/slide6.xml><?xml version="1.0" encoding="utf-8"?>
 <p:sld xmlns:a="http://schemas.openxmlformats.org/drawingml/2006/main" xmlns:r="http://schemas.openxmlformats.org/officeDocument/2006/relationships" xmlns:p="http://schemas.openxmlformats.org/presentationml/2006/main">
   <p:cSld>
     <p:spTree>
@@ -13166,7 +13488,7 @@
 </p:sld>
 </file>
 
-<file path=ppt/slides/slide6.xml><?xml version="1.0" encoding="utf-8"?>
+<file path=ppt/slides/slide7.xml><?xml version="1.0" encoding="utf-8"?>
 <p:sld xmlns:a="http://schemas.openxmlformats.org/drawingml/2006/main" xmlns:r="http://schemas.openxmlformats.org/officeDocument/2006/relationships" xmlns:p="http://schemas.openxmlformats.org/presentationml/2006/main">
   <p:cSld>
     <p:spTree>
@@ -13380,7 +13702,7 @@
 </p:sld>
 </file>
 
-<file path=ppt/slides/slide7.xml><?xml version="1.0" encoding="utf-8"?>
+<file path=ppt/slides/slide8.xml><?xml version="1.0" encoding="utf-8"?>
 <p:sld xmlns:a="http://schemas.openxmlformats.org/drawingml/2006/main" xmlns:r="http://schemas.openxmlformats.org/officeDocument/2006/relationships" xmlns:p="http://schemas.openxmlformats.org/presentationml/2006/main">
   <p:cSld>
     <p:spTree>
@@ -13529,300 +13851,6 @@
 </p:sld>
 </file>
 
-<file path=ppt/slides/slide8.xml><?xml version="1.0" encoding="utf-8"?>
-<p:sld xmlns:a="http://schemas.openxmlformats.org/drawingml/2006/main" xmlns:r="http://schemas.openxmlformats.org/officeDocument/2006/relationships" xmlns:p="http://schemas.openxmlformats.org/presentationml/2006/main">
-  <p:cSld>
-    <p:spTree>
-      <p:nvGrpSpPr>
-        <p:cNvPr id="1" name=""/>
-        <p:cNvGrpSpPr/>
-        <p:nvPr/>
-      </p:nvGrpSpPr>
-      <p:grpSpPr>
-        <a:xfrm>
-          <a:off x="0" y="0"/>
-          <a:ext cx="0" cy="0"/>
-          <a:chOff x="0" y="0"/>
-          <a:chExt cx="0" cy="0"/>
-        </a:xfrm>
-      </p:grpSpPr>
-      <p:sp>
-        <p:nvSpPr>
-          <p:cNvPr id="130" name="TextShape 1"/>
-          <p:cNvSpPr txBox="1"/>
-          <p:nvPr/>
-        </p:nvSpPr>
-        <p:spPr>
-          <a:xfrm>
-            <a:off x="646200" y="452880"/>
-            <a:ext cx="9404280" cy="1400040"/>
-          </a:xfrm>
-          <a:prstGeom prst="rect">
-            <a:avLst/>
-          </a:prstGeom>
-          <a:noFill/>
-          <a:ln>
-            <a:noFill/>
-          </a:ln>
-        </p:spPr>
-        <p:txBody>
-          <a:bodyPr/>
-          <a:lstStyle/>
-          <a:p>
-            <a:pPr>
-              <a:lnSpc>
-                <a:spcPct val="100000"/>
-              </a:lnSpc>
-            </a:pPr>
-            <a:r>
-              <a:rPr lang="en-US" sz="4200" b="0" strike="noStrike" spc="-1">
-                <a:solidFill>
-                  <a:srgbClr val="EBEBEB"/>
-                </a:solidFill>
-                <a:uFill>
-                  <a:solidFill>
-                    <a:srgbClr val="FFFFFF"/>
-                  </a:solidFill>
-                </a:uFill>
-                <a:latin typeface="Century Gothic"/>
-              </a:rPr>
-              <a:t>Resolving Merge Conflicts</a:t>
-            </a:r>
-            <a:endParaRPr lang="en-US" sz="1800" b="0" strike="noStrike" spc="-1">
-              <a:solidFill>
-                <a:srgbClr val="FFFFFF"/>
-              </a:solidFill>
-              <a:uFill>
-                <a:solidFill>
-                  <a:srgbClr val="FFFFFF"/>
-                </a:solidFill>
-              </a:uFill>
-              <a:latin typeface="Century Gothic"/>
-            </a:endParaRPr>
-          </a:p>
-        </p:txBody>
-      </p:sp>
-      <p:sp>
-        <p:nvSpPr>
-          <p:cNvPr id="131" name="TextShape 2"/>
-          <p:cNvSpPr txBox="1"/>
-          <p:nvPr/>
-        </p:nvSpPr>
-        <p:spPr>
-          <a:xfrm>
-            <a:off x="1103400" y="2053080"/>
-            <a:ext cx="8946360" cy="4195080"/>
-          </a:xfrm>
-          <a:prstGeom prst="rect">
-            <a:avLst/>
-          </a:prstGeom>
-          <a:noFill/>
-          <a:ln>
-            <a:noFill/>
-          </a:ln>
-        </p:spPr>
-        <p:txBody>
-          <a:bodyPr/>
-          <a:lstStyle/>
-          <a:p>
-            <a:pPr marL="343080" indent="-342720">
-              <a:lnSpc>
-                <a:spcPct val="100000"/>
-              </a:lnSpc>
-              <a:buClr>
-                <a:srgbClr val="8AD0D6"/>
-              </a:buClr>
-              <a:buSzPct val="80000"/>
-              <a:buFont typeface="Wingdings 3" charset="2"/>
-              <a:buChar char=""/>
-            </a:pPr>
-            <a:r>
-              <a:rPr lang="en-US" sz="2000" b="0" strike="noStrike" spc="-1">
-                <a:solidFill>
-                  <a:srgbClr val="FFFFFF"/>
-                </a:solidFill>
-                <a:uFill>
-                  <a:solidFill>
-                    <a:srgbClr val="FFFFFF"/>
-                  </a:solidFill>
-                </a:uFill>
-                <a:latin typeface="Century Gothic"/>
-              </a:rPr>
-              <a:t>Stay calm</a:t>
-            </a:r>
-          </a:p>
-          <a:p>
-            <a:pPr marL="343080" indent="-342720">
-              <a:lnSpc>
-                <a:spcPct val="100000"/>
-              </a:lnSpc>
-              <a:buClr>
-                <a:srgbClr val="8AD0D6"/>
-              </a:buClr>
-              <a:buSzPct val="80000"/>
-              <a:buFont typeface="Wingdings 3" charset="2"/>
-              <a:buChar char=""/>
-            </a:pPr>
-            <a:r>
-              <a:rPr lang="en-US" sz="2000" b="0" strike="noStrike" spc="-1">
-                <a:solidFill>
-                  <a:srgbClr val="FFFFFF"/>
-                </a:solidFill>
-                <a:uFill>
-                  <a:solidFill>
-                    <a:srgbClr val="FFFFFF"/>
-                  </a:solidFill>
-                </a:uFill>
-                <a:latin typeface="Century Gothic"/>
-              </a:rPr>
-              <a:t>Read the marked changes</a:t>
-            </a:r>
-          </a:p>
-          <a:p>
-            <a:pPr marL="343080" indent="-342720">
-              <a:lnSpc>
-                <a:spcPct val="100000"/>
-              </a:lnSpc>
-              <a:buClr>
-                <a:srgbClr val="8AD0D6"/>
-              </a:buClr>
-              <a:buSzPct val="80000"/>
-              <a:buFont typeface="Wingdings 3" charset="2"/>
-              <a:buChar char=""/>
-            </a:pPr>
-            <a:r>
-              <a:rPr lang="en-US" sz="2000" b="0" strike="noStrike" spc="-1">
-                <a:solidFill>
-                  <a:srgbClr val="FFFFFF"/>
-                </a:solidFill>
-                <a:uFill>
-                  <a:solidFill>
-                    <a:srgbClr val="FFFFFF"/>
-                  </a:solidFill>
-                </a:uFill>
-                <a:latin typeface="Century Gothic"/>
-              </a:rPr>
-              <a:t>Talk with your partner(s)</a:t>
-            </a:r>
-          </a:p>
-          <a:p>
-            <a:pPr marL="343080" indent="-342720">
-              <a:lnSpc>
-                <a:spcPct val="100000"/>
-              </a:lnSpc>
-              <a:buClr>
-                <a:srgbClr val="8AD0D6"/>
-              </a:buClr>
-              <a:buSzPct val="80000"/>
-              <a:buFont typeface="Wingdings 3" charset="2"/>
-              <a:buChar char=""/>
-            </a:pPr>
-            <a:r>
-              <a:rPr lang="en-US" sz="2000" b="0" strike="noStrike" spc="-1">
-                <a:solidFill>
-                  <a:srgbClr val="FFFFFF"/>
-                </a:solidFill>
-                <a:uFill>
-                  <a:solidFill>
-                    <a:srgbClr val="FFFFFF"/>
-                  </a:solidFill>
-                </a:uFill>
-                <a:latin typeface="Century Gothic"/>
-              </a:rPr>
-              <a:t>Figure out what to keep</a:t>
-            </a:r>
-          </a:p>
-          <a:p>
-            <a:pPr marL="343080" indent="-342720">
-              <a:lnSpc>
-                <a:spcPct val="100000"/>
-              </a:lnSpc>
-              <a:buClr>
-                <a:srgbClr val="8AD0D6"/>
-              </a:buClr>
-              <a:buSzPct val="80000"/>
-              <a:buFont typeface="Wingdings 3" charset="2"/>
-              <a:buChar char=""/>
-            </a:pPr>
-            <a:r>
-              <a:rPr lang="en-US" sz="2000" b="0" strike="noStrike" spc="-1">
-                <a:solidFill>
-                  <a:srgbClr val="FFFFFF"/>
-                </a:solidFill>
-                <a:uFill>
-                  <a:solidFill>
-                    <a:srgbClr val="FFFFFF"/>
-                  </a:solidFill>
-                </a:uFill>
-                <a:latin typeface="Century Gothic"/>
-              </a:rPr>
-              <a:t>Edit accordingly</a:t>
-            </a:r>
-          </a:p>
-          <a:p>
-            <a:pPr marL="343080" indent="-342720">
-              <a:lnSpc>
-                <a:spcPct val="100000"/>
-              </a:lnSpc>
-              <a:buClr>
-                <a:srgbClr val="8AD0D6"/>
-              </a:buClr>
-              <a:buSzPct val="80000"/>
-              <a:buFont typeface="Wingdings 3" charset="2"/>
-              <a:buChar char=""/>
-            </a:pPr>
-            <a:r>
-              <a:rPr lang="en-US" sz="2000" b="0" strike="noStrike" spc="-1">
-                <a:solidFill>
-                  <a:srgbClr val="FFFFFF"/>
-                </a:solidFill>
-                <a:uFill>
-                  <a:solidFill>
-                    <a:srgbClr val="FFFFFF"/>
-                  </a:solidFill>
-                </a:uFill>
-                <a:latin typeface="Century Gothic"/>
-              </a:rPr>
-              <a:t>Push changes</a:t>
-            </a:r>
-          </a:p>
-        </p:txBody>
-      </p:sp>
-    </p:spTree>
-  </p:cSld>
-  <p:clrMapOvr>
-    <a:masterClrMapping/>
-  </p:clrMapOvr>
-  <p:timing>
-    <p:tnLst>
-      <p:par>
-        <p:cTn id="1" dur="indefinite" restart="never" nodeType="tmRoot">
-          <p:childTnLst>
-            <p:seq>
-              <p:cTn id="2" nodeType="mainSeq"/>
-              <p:prevCondLst>
-                <p:cond evt="onPrev" delay="0">
-                  <p:tgtEl>
-                    <p:sldTgt/>
-                  </p:tgtEl>
-                </p:cond>
-              </p:prevCondLst>
-              <p:nextCondLst>
-                <p:cond evt="onNext" delay="0">
-                  <p:tgtEl>
-                    <p:sldTgt/>
-                  </p:tgtEl>
-                </p:cond>
-              </p:nextCondLst>
-            </p:seq>
-          </p:childTnLst>
-        </p:cTn>
-      </p:par>
-    </p:tnLst>
-  </p:timing>
-</p:sld>
-</file>
-
 <file path=ppt/slides/slide9.xml><?xml version="1.0" encoding="utf-8"?>
 <p:sld xmlns:a="http://schemas.openxmlformats.org/drawingml/2006/main" xmlns:r="http://schemas.openxmlformats.org/officeDocument/2006/relationships" xmlns:p="http://schemas.openxmlformats.org/presentationml/2006/main">
   <p:cSld>
@@ -13842,7 +13870,7 @@
       </p:grpSpPr>
       <p:sp>
         <p:nvSpPr>
-          <p:cNvPr id="132" name="TextShape 1"/>
+          <p:cNvPr id="130" name="TextShape 1"/>
           <p:cNvSpPr txBox="1"/>
           <p:nvPr/>
         </p:nvSpPr>
@@ -13880,7 +13908,7 @@
                 </a:uFill>
                 <a:latin typeface="Century Gothic"/>
               </a:rPr>
-              <a:t>Using with your Clark CS Account</a:t>
+              <a:t>Resolving Merge Conflicts</a:t>
             </a:r>
             <a:endParaRPr lang="en-US" sz="1800" b="0" strike="noStrike" spc="-1">
               <a:solidFill>
@@ -13898,7 +13926,7 @@
       </p:sp>
       <p:sp>
         <p:nvSpPr>
-          <p:cNvPr id="133" name="TextShape 2"/>
+          <p:cNvPr id="131" name="TextShape 2"/>
           <p:cNvSpPr txBox="1"/>
           <p:nvPr/>
         </p:nvSpPr>
@@ -13942,7 +13970,7 @@
                 </a:uFill>
                 <a:latin typeface="Century Gothic"/>
               </a:rPr>
-              <a:t>Create a repository on system</a:t>
+              <a:t>Stay calm</a:t>
             </a:r>
           </a:p>
           <a:p>
@@ -13969,7 +13997,7 @@
                 </a:uFill>
                 <a:latin typeface="Century Gothic"/>
               </a:rPr>
-              <a:t>Commit changes</a:t>
+              <a:t>Read the marked changes</a:t>
             </a:r>
           </a:p>
           <a:p>
@@ -13996,33 +14024,8 @@
                 </a:uFill>
                 <a:latin typeface="Century Gothic"/>
               </a:rPr>
-              <a:t>On local computer, </a:t>
-            </a:r>
-            <a:r>
-              <a:rPr lang="en-US" sz="2000" b="0" strike="noStrike" spc="-1">
-                <a:solidFill>
-                  <a:srgbClr val="FFFFFF"/>
-                </a:solidFill>
-                <a:uFill>
-                  <a:solidFill>
-                    <a:srgbClr val="FFFFFF"/>
-                  </a:solidFill>
-                </a:uFill>
-                <a:latin typeface="Courier New"/>
-              </a:rPr>
-              <a:t>git clone ssh://username@csgateway.clarku.edu/home/username/pathtorepo</a:t>
-            </a:r>
-            <a:endParaRPr lang="en-US" sz="2000" b="0" strike="noStrike" spc="-1">
-              <a:solidFill>
-                <a:srgbClr val="FFFFFF"/>
-              </a:solidFill>
-              <a:uFill>
-                <a:solidFill>
-                  <a:srgbClr val="FFFFFF"/>
-                </a:solidFill>
-              </a:uFill>
-              <a:latin typeface="Century Gothic"/>
-            </a:endParaRPr>
+              <a:t>Talk with your partner(s)</a:t>
+            </a:r>
           </a:p>
           <a:p>
             <a:pPr marL="343080" indent="-342720">
@@ -14048,7 +14051,61 @@
                 </a:uFill>
                 <a:latin typeface="Century Gothic"/>
               </a:rPr>
-              <a:t>Won’t work with pair programming</a:t>
+              <a:t>Figure out what to keep</a:t>
+            </a:r>
+          </a:p>
+          <a:p>
+            <a:pPr marL="343080" indent="-342720">
+              <a:lnSpc>
+                <a:spcPct val="100000"/>
+              </a:lnSpc>
+              <a:buClr>
+                <a:srgbClr val="8AD0D6"/>
+              </a:buClr>
+              <a:buSzPct val="80000"/>
+              <a:buFont typeface="Wingdings 3" charset="2"/>
+              <a:buChar char=""/>
+            </a:pPr>
+            <a:r>
+              <a:rPr lang="en-US" sz="2000" b="0" strike="noStrike" spc="-1">
+                <a:solidFill>
+                  <a:srgbClr val="FFFFFF"/>
+                </a:solidFill>
+                <a:uFill>
+                  <a:solidFill>
+                    <a:srgbClr val="FFFFFF"/>
+                  </a:solidFill>
+                </a:uFill>
+                <a:latin typeface="Century Gothic"/>
+              </a:rPr>
+              <a:t>Edit accordingly</a:t>
+            </a:r>
+          </a:p>
+          <a:p>
+            <a:pPr marL="343080" indent="-342720">
+              <a:lnSpc>
+                <a:spcPct val="100000"/>
+              </a:lnSpc>
+              <a:buClr>
+                <a:srgbClr val="8AD0D6"/>
+              </a:buClr>
+              <a:buSzPct val="80000"/>
+              <a:buFont typeface="Wingdings 3" charset="2"/>
+              <a:buChar char=""/>
+            </a:pPr>
+            <a:r>
+              <a:rPr lang="en-US" sz="2000" b="0" strike="noStrike" spc="-1">
+                <a:solidFill>
+                  <a:srgbClr val="FFFFFF"/>
+                </a:solidFill>
+                <a:uFill>
+                  <a:solidFill>
+                    <a:srgbClr val="FFFFFF"/>
+                  </a:solidFill>
+                </a:uFill>
+                <a:latin typeface="Century Gothic"/>
+              </a:rPr>
+              <a:t>Push changes</a:t>
             </a:r>
           </a:p>
         </p:txBody>

</xml_diff>

<commit_message>
Added missing dash on git --help
</commit_message>
<xml_diff>
--- a/Git 101.pptx
+++ b/Git 101.pptx
@@ -1874,7 +1874,7 @@
           <a:p>
             <a:fld id="{4AAD347D-5ACD-4C99-B74B-A9C85AD731AF}" type="datetimeFigureOut">
               <a:rPr lang="en-US" dirty="0"/>
-              <a:t>2/22/2017</a:t>
+              <a:t>2/23/2017</a:t>
             </a:fld>
             <a:endParaRPr lang="en-US" dirty="0"/>
           </a:p>
@@ -6781,7 +6781,7 @@
           <a:p>
             <a:fld id="{4509A250-FF31-4206-8172-F9D3106AACB1}" type="datetimeFigureOut">
               <a:rPr lang="en-US" dirty="0"/>
-              <a:t>2/22/2017</a:t>
+              <a:t>2/23/2017</a:t>
             </a:fld>
             <a:endParaRPr lang="en-US" dirty="0"/>
           </a:p>
@@ -12970,8 +12970,35 @@
                 <a:latin typeface="Courier New" panose="02070309020205020404" pitchFamily="49" charset="0"/>
                 <a:cs typeface="Courier New" panose="02070309020205020404" pitchFamily="49" charset="0"/>
               </a:rPr>
-              <a:t>git command –help</a:t>
-            </a:r>
+              <a:t>git </a:t>
+            </a:r>
+            <a:r>
+              <a:rPr lang="en-US" sz="2000" spc="-1">
+                <a:solidFill>
+                  <a:srgbClr val="FFFFFF"/>
+                </a:solidFill>
+                <a:uFill>
+                  <a:solidFill>
+                    <a:srgbClr val="FFFFFF"/>
+                  </a:solidFill>
+                </a:uFill>
+                <a:latin typeface="Courier New" panose="02070309020205020404" pitchFamily="49" charset="0"/>
+                <a:cs typeface="Courier New" panose="02070309020205020404" pitchFamily="49" charset="0"/>
+              </a:rPr>
+              <a:t>command --help</a:t>
+            </a:r>
+            <a:endParaRPr lang="en-US" sz="2000" spc="-1" dirty="0">
+              <a:solidFill>
+                <a:srgbClr val="FFFFFF"/>
+              </a:solidFill>
+              <a:uFill>
+                <a:solidFill>
+                  <a:srgbClr val="FFFFFF"/>
+                </a:solidFill>
+              </a:uFill>
+              <a:latin typeface="Courier New" panose="02070309020205020404" pitchFamily="49" charset="0"/>
+              <a:cs typeface="Courier New" panose="02070309020205020404" pitchFamily="49" charset="0"/>
+            </a:endParaRPr>
           </a:p>
           <a:p>
             <a:pPr marL="800280" lvl="1" indent="-342720">

</xml_diff>